<commit_message>
Changed Theme, finished my slides
</commit_message>
<xml_diff>
--- a/Pitch materials/Pitch.pptx
+++ b/Pitch materials/Pitch.pptx
@@ -6,13 +6,13 @@
   </p:sldMasterIdLst>
   <p:sldIdLst>
     <p:sldId id="256" r:id="rId2"/>
-    <p:sldId id="257" r:id="rId3"/>
-    <p:sldId id="258" r:id="rId4"/>
-    <p:sldId id="259" r:id="rId5"/>
-    <p:sldId id="262" r:id="rId6"/>
-    <p:sldId id="260" r:id="rId7"/>
-    <p:sldId id="261" r:id="rId8"/>
-    <p:sldId id="263" r:id="rId9"/>
+    <p:sldId id="265" r:id="rId3"/>
+    <p:sldId id="266" r:id="rId4"/>
+    <p:sldId id="267" r:id="rId5"/>
+    <p:sldId id="268" r:id="rId6"/>
+    <p:sldId id="269" r:id="rId7"/>
+    <p:sldId id="270" r:id="rId8"/>
+    <p:sldId id="271" r:id="rId9"/>
     <p:sldId id="264" r:id="rId10"/>
   </p:sldIdLst>
   <p:sldSz cx="12192000" cy="6858000"/>
@@ -3447,6 +3447,16 @@
 <file path=ppt/slides/slide1.xml><?xml version="1.0" encoding="utf-8"?>
 <p:sld xmlns:a="http://schemas.openxmlformats.org/drawingml/2006/main" xmlns:r="http://schemas.openxmlformats.org/officeDocument/2006/relationships" xmlns:p="http://schemas.openxmlformats.org/presentationml/2006/main">
   <p:cSld>
+    <p:bg>
+      <p:bgPr>
+        <a:solidFill>
+          <a:schemeClr val="bg2">
+            <a:lumMod val="75000"/>
+          </a:schemeClr>
+        </a:solidFill>
+        <a:effectLst/>
+      </p:bgPr>
+    </p:bg>
     <p:spTree>
       <p:nvGrpSpPr>
         <p:cNvPr id="1" name=""/>
@@ -3463,6 +3473,69 @@
       </p:grpSpPr>
       <p:sp>
         <p:nvSpPr>
+          <p:cNvPr id="8" name="Rectangle 7">
+            <a:extLst>
+              <a:ext uri="{FF2B5EF4-FFF2-40B4-BE49-F238E27FC236}">
+                <a16:creationId xmlns:a16="http://schemas.microsoft.com/office/drawing/2014/main" id="{336435E3-1914-4453-A41E-2849F6B488D7}"/>
+              </a:ext>
+              <a:ext uri="{C183D7F6-B498-43B3-948B-1728B52AA6E4}">
+                <adec:decorative xmlns:adec="http://schemas.microsoft.com/office/drawing/2017/decorative" val="1"/>
+              </a:ext>
+            </a:extLst>
+          </p:cNvPr>
+          <p:cNvSpPr>
+            <a:spLocks noGrp="1" noRot="1" noChangeAspect="1" noMove="1" noResize="1" noEditPoints="1" noAdjustHandles="1" noChangeArrowheads="1" noChangeShapeType="1" noTextEdit="1"/>
+          </p:cNvSpPr>
+          <p:nvPr>
+            <p:extLst>
+              <p:ext uri="{386F3935-93C4-4BCD-93E2-E3B085C9AB24}">
+                <p16:designElem xmlns:p16="http://schemas.microsoft.com/office/powerpoint/2015/main" val="1"/>
+              </p:ext>
+            </p:extLst>
+          </p:nvPr>
+        </p:nvSpPr>
+        <p:spPr>
+          <a:xfrm>
+            <a:off x="-1" y="-2811"/>
+            <a:ext cx="11292841" cy="4236483"/>
+          </a:xfrm>
+          <a:prstGeom prst="rect">
+            <a:avLst/>
+          </a:prstGeom>
+          <a:solidFill>
+            <a:srgbClr val="1C1C1C"/>
+          </a:solidFill>
+          <a:ln>
+            <a:noFill/>
+          </a:ln>
+        </p:spPr>
+        <p:style>
+          <a:lnRef idx="2">
+            <a:schemeClr val="accent1">
+              <a:shade val="50000"/>
+            </a:schemeClr>
+          </a:lnRef>
+          <a:fillRef idx="1">
+            <a:schemeClr val="accent1"/>
+          </a:fillRef>
+          <a:effectRef idx="0">
+            <a:schemeClr val="accent1"/>
+          </a:effectRef>
+          <a:fontRef idx="minor">
+            <a:schemeClr val="lt1"/>
+          </a:fontRef>
+        </p:style>
+        <p:txBody>
+          <a:bodyPr rtlCol="0" anchor="ctr"/>
+          <a:lstStyle/>
+          <a:p>
+            <a:pPr algn="ctr"/>
+            <a:endParaRPr lang="en-US"/>
+          </a:p>
+        </p:txBody>
+      </p:sp>
+      <p:sp>
+        <p:nvSpPr>
           <p:cNvPr id="2" name="Title 1">
             <a:extLst>
               <a:ext uri="{FF2B5EF4-FFF2-40B4-BE49-F238E27FC236}">
@@ -3477,15 +3550,89 @@
             <p:ph type="ctrTitle"/>
           </p:nvPr>
         </p:nvSpPr>
-        <p:spPr/>
-        <p:txBody>
-          <a:bodyPr/>
-          <a:lstStyle/>
-          <a:p>
-            <a:r>
-              <a:rPr lang="en-US" dirty="0"/>
+        <p:spPr>
+          <a:xfrm>
+            <a:off x="643467" y="228599"/>
+            <a:ext cx="10438510" cy="4005071"/>
+          </a:xfrm>
+        </p:spPr>
+        <p:txBody>
+          <a:bodyPr anchor="ctr">
+            <a:normAutofit/>
+          </a:bodyPr>
+          <a:lstStyle/>
+          <a:p>
+            <a:r>
+              <a:rPr lang="en-US" sz="5400">
+                <a:solidFill>
+                  <a:srgbClr val="FFFFFF"/>
+                </a:solidFill>
+              </a:rPr>
               <a:t>Perl 5</a:t>
             </a:r>
+          </a:p>
+        </p:txBody>
+      </p:sp>
+      <p:sp>
+        <p:nvSpPr>
+          <p:cNvPr id="10" name="Rectangle 9">
+            <a:extLst>
+              <a:ext uri="{FF2B5EF4-FFF2-40B4-BE49-F238E27FC236}">
+                <a16:creationId xmlns:a16="http://schemas.microsoft.com/office/drawing/2014/main" id="{956E287F-2B11-4E25-A381-2FB11B41332C}"/>
+              </a:ext>
+              <a:ext uri="{C183D7F6-B498-43B3-948B-1728B52AA6E4}">
+                <adec:decorative xmlns:adec="http://schemas.microsoft.com/office/drawing/2017/decorative" val="1"/>
+              </a:ext>
+            </a:extLst>
+          </p:cNvPr>
+          <p:cNvSpPr>
+            <a:spLocks noGrp="1" noRot="1" noChangeAspect="1" noMove="1" noResize="1" noEditPoints="1" noAdjustHandles="1" noChangeArrowheads="1" noChangeShapeType="1" noTextEdit="1"/>
+          </p:cNvSpPr>
+          <p:nvPr>
+            <p:extLst>
+              <p:ext uri="{386F3935-93C4-4BCD-93E2-E3B085C9AB24}">
+                <p16:designElem xmlns:p16="http://schemas.microsoft.com/office/powerpoint/2015/main" val="1"/>
+              </p:ext>
+            </p:extLst>
+          </p:nvPr>
+        </p:nvSpPr>
+        <p:spPr>
+          <a:xfrm>
+            <a:off x="1" y="4233670"/>
+            <a:ext cx="11292840" cy="2624330"/>
+          </a:xfrm>
+          <a:prstGeom prst="rect">
+            <a:avLst/>
+          </a:prstGeom>
+          <a:solidFill>
+            <a:schemeClr val="bg2"/>
+          </a:solidFill>
+          <a:ln>
+            <a:noFill/>
+          </a:ln>
+        </p:spPr>
+        <p:style>
+          <a:lnRef idx="2">
+            <a:schemeClr val="accent1">
+              <a:shade val="50000"/>
+            </a:schemeClr>
+          </a:lnRef>
+          <a:fillRef idx="1">
+            <a:schemeClr val="accent1"/>
+          </a:fillRef>
+          <a:effectRef idx="0">
+            <a:schemeClr val="accent1"/>
+          </a:effectRef>
+          <a:fontRef idx="minor">
+            <a:schemeClr val="lt1"/>
+          </a:fontRef>
+        </p:style>
+        <p:txBody>
+          <a:bodyPr rtlCol="0" anchor="ctr"/>
+          <a:lstStyle/>
+          <a:p>
+            <a:pPr algn="ctr"/>
+            <a:endParaRPr lang="en-US"/>
           </a:p>
         </p:txBody>
       </p:sp>
@@ -3505,25 +3652,45 @@
             <p:ph type="subTitle" idx="1"/>
           </p:nvPr>
         </p:nvSpPr>
-        <p:spPr/>
-        <p:txBody>
-          <a:bodyPr/>
-          <a:lstStyle/>
-          <a:p>
-            <a:r>
-              <a:rPr lang="en-US" dirty="0"/>
+        <p:spPr>
+          <a:xfrm>
+            <a:off x="643467" y="4550832"/>
+            <a:ext cx="10438510" cy="2068332"/>
+          </a:xfrm>
+          <a:noFill/>
+        </p:spPr>
+        <p:txBody>
+          <a:bodyPr anchor="t">
+            <a:normAutofit/>
+          </a:bodyPr>
+          <a:lstStyle/>
+          <a:p>
+            <a:r>
+              <a:rPr lang="en-US" sz="3600">
+                <a:solidFill>
+                  <a:schemeClr val="tx1"/>
+                </a:solidFill>
+              </a:rPr>
               <a:t>Alex Murtha</a:t>
             </a:r>
           </a:p>
           <a:p>
             <a:r>
-              <a:rPr lang="en-US" dirty="0"/>
+              <a:rPr lang="en-US" sz="3600">
+                <a:solidFill>
+                  <a:schemeClr val="tx1"/>
+                </a:solidFill>
+              </a:rPr>
               <a:t>Dustin Cook</a:t>
             </a:r>
           </a:p>
           <a:p>
             <a:r>
-              <a:rPr lang="en-US" dirty="0"/>
+              <a:rPr lang="en-US" sz="3600">
+                <a:solidFill>
+                  <a:schemeClr val="tx1"/>
+                </a:solidFill>
+              </a:rPr>
               <a:t>Dylan Shaffer</a:t>
             </a:r>
           </a:p>
@@ -3545,6 +3712,14 @@
 <file path=ppt/slides/slide2.xml><?xml version="1.0" encoding="utf-8"?>
 <p:sld xmlns:a="http://schemas.openxmlformats.org/drawingml/2006/main" xmlns:r="http://schemas.openxmlformats.org/officeDocument/2006/relationships" xmlns:p="http://schemas.openxmlformats.org/presentationml/2006/main">
   <p:cSld>
+    <p:bg>
+      <p:bgPr>
+        <a:solidFill>
+          <a:schemeClr val="bg1"/>
+        </a:solidFill>
+        <a:effectLst/>
+      </p:bgPr>
+    </p:bg>
     <p:spTree>
       <p:nvGrpSpPr>
         <p:cNvPr id="1" name=""/>
@@ -3561,10 +3736,138 @@
       </p:grpSpPr>
       <p:sp>
         <p:nvSpPr>
+          <p:cNvPr id="8" name="Rectangle 7">
+            <a:extLst>
+              <a:ext uri="{FF2B5EF4-FFF2-40B4-BE49-F238E27FC236}">
+                <a16:creationId xmlns:a16="http://schemas.microsoft.com/office/drawing/2014/main" id="{F112E318-8843-4FBA-9CB8-AC44622DE78F}"/>
+              </a:ext>
+              <a:ext uri="{C183D7F6-B498-43B3-948B-1728B52AA6E4}">
+                <adec:decorative xmlns:adec="http://schemas.microsoft.com/office/drawing/2017/decorative" val="1"/>
+              </a:ext>
+            </a:extLst>
+          </p:cNvPr>
+          <p:cNvSpPr>
+            <a:spLocks noGrp="1" noRot="1" noChangeAspect="1" noMove="1" noResize="1" noEditPoints="1" noAdjustHandles="1" noChangeArrowheads="1" noChangeShapeType="1" noTextEdit="1"/>
+          </p:cNvSpPr>
+          <p:nvPr>
+            <p:extLst>
+              <p:ext uri="{386F3935-93C4-4BCD-93E2-E3B085C9AB24}">
+                <p16:designElem xmlns:p16="http://schemas.microsoft.com/office/powerpoint/2015/main" val="1"/>
+              </p:ext>
+            </p:extLst>
+          </p:nvPr>
+        </p:nvSpPr>
+        <p:spPr>
+          <a:xfrm>
+            <a:off x="0" y="0"/>
+            <a:ext cx="11292840" cy="6858000"/>
+          </a:xfrm>
+          <a:prstGeom prst="rect">
+            <a:avLst/>
+          </a:prstGeom>
+          <a:solidFill>
+            <a:srgbClr val="FFFFFF"/>
+          </a:solidFill>
+          <a:ln>
+            <a:noFill/>
+          </a:ln>
+        </p:spPr>
+        <p:style>
+          <a:lnRef idx="2">
+            <a:schemeClr val="accent1">
+              <a:shade val="50000"/>
+            </a:schemeClr>
+          </a:lnRef>
+          <a:fillRef idx="1">
+            <a:schemeClr val="accent1"/>
+          </a:fillRef>
+          <a:effectRef idx="0">
+            <a:schemeClr val="accent1"/>
+          </a:effectRef>
+          <a:fontRef idx="minor">
+            <a:schemeClr val="lt1"/>
+          </a:fontRef>
+        </p:style>
+        <p:txBody>
+          <a:bodyPr rtlCol="0" anchor="ctr"/>
+          <a:lstStyle/>
+          <a:p>
+            <a:pPr algn="ctr"/>
+            <a:endParaRPr lang="en-US"/>
+          </a:p>
+        </p:txBody>
+      </p:sp>
+      <p:sp>
+        <p:nvSpPr>
+          <p:cNvPr id="10" name="Rectangle 9">
+            <a:extLst>
+              <a:ext uri="{FF2B5EF4-FFF2-40B4-BE49-F238E27FC236}">
+                <a16:creationId xmlns:a16="http://schemas.microsoft.com/office/drawing/2014/main" id="{095418D5-11A6-457F-8BCD-5160B33D6935}"/>
+              </a:ext>
+              <a:ext uri="{C183D7F6-B498-43B3-948B-1728B52AA6E4}">
+                <adec:decorative xmlns:adec="http://schemas.microsoft.com/office/drawing/2017/decorative" val="1"/>
+              </a:ext>
+            </a:extLst>
+          </p:cNvPr>
+          <p:cNvSpPr>
+            <a:spLocks noGrp="1" noRot="1" noChangeAspect="1" noMove="1" noResize="1" noEditPoints="1" noAdjustHandles="1" noChangeArrowheads="1" noChangeShapeType="1" noTextEdit="1"/>
+          </p:cNvSpPr>
+          <p:nvPr>
+            <p:extLst>
+              <p:ext uri="{386F3935-93C4-4BCD-93E2-E3B085C9AB24}">
+                <p16:designElem xmlns:p16="http://schemas.microsoft.com/office/powerpoint/2015/main" val="1"/>
+              </p:ext>
+            </p:extLst>
+          </p:nvPr>
+        </p:nvSpPr>
+        <p:spPr>
+          <a:xfrm>
+            <a:off x="899160" y="0"/>
+            <a:ext cx="10393679" cy="6858000"/>
+          </a:xfrm>
+          <a:prstGeom prst="rect">
+            <a:avLst/>
+          </a:prstGeom>
+          <a:solidFill>
+            <a:schemeClr val="tx2">
+              <a:lumMod val="50000"/>
+            </a:schemeClr>
+          </a:solidFill>
+          <a:ln>
+            <a:noFill/>
+          </a:ln>
+        </p:spPr>
+        <p:style>
+          <a:lnRef idx="2">
+            <a:schemeClr val="accent1">
+              <a:shade val="50000"/>
+            </a:schemeClr>
+          </a:lnRef>
+          <a:fillRef idx="1">
+            <a:schemeClr val="accent1"/>
+          </a:fillRef>
+          <a:effectRef idx="0">
+            <a:schemeClr val="accent1"/>
+          </a:effectRef>
+          <a:fontRef idx="minor">
+            <a:schemeClr val="lt1"/>
+          </a:fontRef>
+        </p:style>
+        <p:txBody>
+          <a:bodyPr rtlCol="0" anchor="ctr"/>
+          <a:lstStyle/>
+          <a:p>
+            <a:pPr algn="ctr"/>
+            <a:endParaRPr lang="en-US"/>
+          </a:p>
+        </p:txBody>
+      </p:sp>
+      <p:sp>
+        <p:nvSpPr>
           <p:cNvPr id="2" name="Title 1">
             <a:extLst>
               <a:ext uri="{FF2B5EF4-FFF2-40B4-BE49-F238E27FC236}">
-                <a16:creationId xmlns:a16="http://schemas.microsoft.com/office/drawing/2014/main" id="{09B9F99E-1583-47D5-9A1B-0895226C984F}"/>
+                <a16:creationId xmlns:a16="http://schemas.microsoft.com/office/drawing/2014/main" id="{CCB641FC-B164-4E97-B6D7-989EBB976D46}"/>
               </a:ext>
             </a:extLst>
           </p:cNvPr>
@@ -3575,14 +3878,169 @@
             <p:ph type="title"/>
           </p:nvPr>
         </p:nvSpPr>
-        <p:spPr/>
-        <p:txBody>
-          <a:bodyPr/>
-          <a:lstStyle/>
-          <a:p>
-            <a:r>
-              <a:rPr lang="en-US" dirty="0"/>
+        <p:spPr>
+          <a:xfrm>
+            <a:off x="1220892" y="321732"/>
+            <a:ext cx="9733620" cy="878397"/>
+          </a:xfrm>
+          <a:noFill/>
+        </p:spPr>
+        <p:txBody>
+          <a:bodyPr anchor="ctr">
+            <a:normAutofit/>
+          </a:bodyPr>
+          <a:lstStyle/>
+          <a:p>
+            <a:r>
+              <a:rPr lang="en-US" sz="4000">
+                <a:solidFill>
+                  <a:srgbClr val="FFFFFF"/>
+                </a:solidFill>
+              </a:rPr>
               <a:t>Language Specifications</a:t>
+            </a:r>
+          </a:p>
+        </p:txBody>
+      </p:sp>
+      <p:sp>
+        <p:nvSpPr>
+          <p:cNvPr id="12" name="Rectangle 11">
+            <a:extLst>
+              <a:ext uri="{FF2B5EF4-FFF2-40B4-BE49-F238E27FC236}">
+                <a16:creationId xmlns:a16="http://schemas.microsoft.com/office/drawing/2014/main" id="{D61E5C3D-6980-43E1-B38A-365BF0E6E3F3}"/>
+              </a:ext>
+              <a:ext uri="{C183D7F6-B498-43B3-948B-1728B52AA6E4}">
+                <adec:decorative xmlns:adec="http://schemas.microsoft.com/office/drawing/2017/decorative" val="1"/>
+              </a:ext>
+            </a:extLst>
+          </p:cNvPr>
+          <p:cNvSpPr>
+            <a:spLocks noGrp="1" noRot="1" noChangeAspect="1" noMove="1" noResize="1" noEditPoints="1" noAdjustHandles="1" noChangeArrowheads="1" noChangeShapeType="1" noTextEdit="1"/>
+          </p:cNvSpPr>
+          <p:nvPr>
+            <p:extLst>
+              <p:ext uri="{386F3935-93C4-4BCD-93E2-E3B085C9AB24}">
+                <p16:designElem xmlns:p16="http://schemas.microsoft.com/office/powerpoint/2015/main" val="1"/>
+              </p:ext>
+            </p:extLst>
+          </p:nvPr>
+        </p:nvSpPr>
+        <p:spPr>
+          <a:xfrm>
+            <a:off x="0" y="-2811"/>
+            <a:ext cx="899160" cy="6858000"/>
+          </a:xfrm>
+          <a:prstGeom prst="rect">
+            <a:avLst/>
+          </a:prstGeom>
+          <a:solidFill>
+            <a:schemeClr val="tx2">
+              <a:lumMod val="75000"/>
+            </a:schemeClr>
+          </a:solidFill>
+          <a:ln>
+            <a:noFill/>
+          </a:ln>
+        </p:spPr>
+        <p:style>
+          <a:lnRef idx="2">
+            <a:schemeClr val="accent1">
+              <a:shade val="50000"/>
+            </a:schemeClr>
+          </a:lnRef>
+          <a:fillRef idx="1">
+            <a:schemeClr val="accent1"/>
+          </a:fillRef>
+          <a:effectRef idx="0">
+            <a:schemeClr val="accent1"/>
+          </a:effectRef>
+          <a:fontRef idx="minor">
+            <a:schemeClr val="lt1"/>
+          </a:fontRef>
+        </p:style>
+        <p:txBody>
+          <a:bodyPr rtlCol="0" anchor="ctr"/>
+          <a:lstStyle/>
+          <a:p>
+            <a:pPr algn="ctr"/>
+            <a:endParaRPr lang="en-US"/>
+          </a:p>
+        </p:txBody>
+      </p:sp>
+      <p:sp>
+        <p:nvSpPr>
+          <p:cNvPr id="3" name="Content Placeholder 2">
+            <a:extLst>
+              <a:ext uri="{FF2B5EF4-FFF2-40B4-BE49-F238E27FC236}">
+                <a16:creationId xmlns:a16="http://schemas.microsoft.com/office/drawing/2014/main" id="{10A3F4B8-C6DC-42F4-A598-45F97634224F}"/>
+              </a:ext>
+            </a:extLst>
+          </p:cNvPr>
+          <p:cNvSpPr>
+            <a:spLocks noGrp="1"/>
+          </p:cNvSpPr>
+          <p:nvPr>
+            <p:ph idx="1"/>
+          </p:nvPr>
+        </p:nvSpPr>
+        <p:spPr>
+          <a:xfrm>
+            <a:off x="1220892" y="1828800"/>
+            <a:ext cx="9733620" cy="4351337"/>
+          </a:xfrm>
+        </p:spPr>
+        <p:txBody>
+          <a:bodyPr>
+            <a:normAutofit/>
+          </a:bodyPr>
+          <a:lstStyle/>
+          <a:p>
+            <a:r>
+              <a:rPr lang="en-US" sz="2400" dirty="0">
+                <a:solidFill>
+                  <a:srgbClr val="FFFFFF"/>
+                </a:solidFill>
+              </a:rPr>
+              <a:t>Perl 5 v5.24.3</a:t>
+            </a:r>
+          </a:p>
+          <a:p>
+            <a:endParaRPr lang="en-US" sz="2400" dirty="0">
+              <a:solidFill>
+                <a:srgbClr val="FFFFFF"/>
+              </a:solidFill>
+            </a:endParaRPr>
+          </a:p>
+          <a:p>
+            <a:r>
+              <a:rPr lang="en-US" sz="2400" dirty="0">
+                <a:solidFill>
+                  <a:srgbClr val="FFFFFF"/>
+                </a:solidFill>
+              </a:rPr>
+              <a:t>Platforms</a:t>
+            </a:r>
+          </a:p>
+          <a:p>
+            <a:pPr lvl="1"/>
+            <a:r>
+              <a:rPr lang="en-US" sz="2200" dirty="0">
+                <a:solidFill>
+                  <a:srgbClr val="FFFFFF"/>
+                </a:solidFill>
+              </a:rPr>
+              <a:t>Ubuntu 16</a:t>
+            </a:r>
+          </a:p>
+          <a:p>
+            <a:pPr lvl="1"/>
+            <a:r>
+              <a:rPr lang="en-US" sz="2200" dirty="0">
+                <a:solidFill>
+                  <a:srgbClr val="FFFFFF"/>
+                </a:solidFill>
+              </a:rPr>
+              <a:t>Windows 10</a:t>
             </a:r>
           </a:p>
         </p:txBody>
@@ -3590,7 +4048,7 @@
     </p:spTree>
     <p:extLst>
       <p:ext uri="{BB962C8B-B14F-4D97-AF65-F5344CB8AC3E}">
-        <p14:creationId xmlns:p14="http://schemas.microsoft.com/office/powerpoint/2010/main" val="3135760038"/>
+        <p14:creationId xmlns:p14="http://schemas.microsoft.com/office/powerpoint/2010/main" val="4160861479"/>
       </p:ext>
     </p:extLst>
   </p:cSld>
@@ -3603,6 +4061,14 @@
 <file path=ppt/slides/slide3.xml><?xml version="1.0" encoding="utf-8"?>
 <p:sld xmlns:a="http://schemas.openxmlformats.org/drawingml/2006/main" xmlns:r="http://schemas.openxmlformats.org/officeDocument/2006/relationships" xmlns:p="http://schemas.openxmlformats.org/presentationml/2006/main">
   <p:cSld>
+    <p:bg>
+      <p:bgPr>
+        <a:solidFill>
+          <a:schemeClr val="bg1"/>
+        </a:solidFill>
+        <a:effectLst/>
+      </p:bgPr>
+    </p:bg>
     <p:spTree>
       <p:nvGrpSpPr>
         <p:cNvPr id="1" name=""/>
@@ -3619,10 +4085,138 @@
       </p:grpSpPr>
       <p:sp>
         <p:nvSpPr>
+          <p:cNvPr id="8" name="Rectangle 7">
+            <a:extLst>
+              <a:ext uri="{FF2B5EF4-FFF2-40B4-BE49-F238E27FC236}">
+                <a16:creationId xmlns:a16="http://schemas.microsoft.com/office/drawing/2014/main" id="{F112E318-8843-4FBA-9CB8-AC44622DE78F}"/>
+              </a:ext>
+              <a:ext uri="{C183D7F6-B498-43B3-948B-1728B52AA6E4}">
+                <adec:decorative xmlns:adec="http://schemas.microsoft.com/office/drawing/2017/decorative" val="1"/>
+              </a:ext>
+            </a:extLst>
+          </p:cNvPr>
+          <p:cNvSpPr>
+            <a:spLocks noGrp="1" noRot="1" noChangeAspect="1" noMove="1" noResize="1" noEditPoints="1" noAdjustHandles="1" noChangeArrowheads="1" noChangeShapeType="1" noTextEdit="1"/>
+          </p:cNvSpPr>
+          <p:nvPr>
+            <p:extLst>
+              <p:ext uri="{386F3935-93C4-4BCD-93E2-E3B085C9AB24}">
+                <p16:designElem xmlns:p16="http://schemas.microsoft.com/office/powerpoint/2015/main" val="1"/>
+              </p:ext>
+            </p:extLst>
+          </p:nvPr>
+        </p:nvSpPr>
+        <p:spPr>
+          <a:xfrm>
+            <a:off x="0" y="0"/>
+            <a:ext cx="11292840" cy="6858000"/>
+          </a:xfrm>
+          <a:prstGeom prst="rect">
+            <a:avLst/>
+          </a:prstGeom>
+          <a:solidFill>
+            <a:srgbClr val="FFFFFF"/>
+          </a:solidFill>
+          <a:ln>
+            <a:noFill/>
+          </a:ln>
+        </p:spPr>
+        <p:style>
+          <a:lnRef idx="2">
+            <a:schemeClr val="accent1">
+              <a:shade val="50000"/>
+            </a:schemeClr>
+          </a:lnRef>
+          <a:fillRef idx="1">
+            <a:schemeClr val="accent1"/>
+          </a:fillRef>
+          <a:effectRef idx="0">
+            <a:schemeClr val="accent1"/>
+          </a:effectRef>
+          <a:fontRef idx="minor">
+            <a:schemeClr val="lt1"/>
+          </a:fontRef>
+        </p:style>
+        <p:txBody>
+          <a:bodyPr rtlCol="0" anchor="ctr"/>
+          <a:lstStyle/>
+          <a:p>
+            <a:pPr algn="ctr"/>
+            <a:endParaRPr lang="en-US"/>
+          </a:p>
+        </p:txBody>
+      </p:sp>
+      <p:sp>
+        <p:nvSpPr>
+          <p:cNvPr id="10" name="Rectangle 9">
+            <a:extLst>
+              <a:ext uri="{FF2B5EF4-FFF2-40B4-BE49-F238E27FC236}">
+                <a16:creationId xmlns:a16="http://schemas.microsoft.com/office/drawing/2014/main" id="{095418D5-11A6-457F-8BCD-5160B33D6935}"/>
+              </a:ext>
+              <a:ext uri="{C183D7F6-B498-43B3-948B-1728B52AA6E4}">
+                <adec:decorative xmlns:adec="http://schemas.microsoft.com/office/drawing/2017/decorative" val="1"/>
+              </a:ext>
+            </a:extLst>
+          </p:cNvPr>
+          <p:cNvSpPr>
+            <a:spLocks noGrp="1" noRot="1" noChangeAspect="1" noMove="1" noResize="1" noEditPoints="1" noAdjustHandles="1" noChangeArrowheads="1" noChangeShapeType="1" noTextEdit="1"/>
+          </p:cNvSpPr>
+          <p:nvPr>
+            <p:extLst>
+              <p:ext uri="{386F3935-93C4-4BCD-93E2-E3B085C9AB24}">
+                <p16:designElem xmlns:p16="http://schemas.microsoft.com/office/powerpoint/2015/main" val="1"/>
+              </p:ext>
+            </p:extLst>
+          </p:nvPr>
+        </p:nvSpPr>
+        <p:spPr>
+          <a:xfrm>
+            <a:off x="899160" y="0"/>
+            <a:ext cx="10393679" cy="6858000"/>
+          </a:xfrm>
+          <a:prstGeom prst="rect">
+            <a:avLst/>
+          </a:prstGeom>
+          <a:solidFill>
+            <a:schemeClr val="tx2">
+              <a:lumMod val="50000"/>
+            </a:schemeClr>
+          </a:solidFill>
+          <a:ln>
+            <a:noFill/>
+          </a:ln>
+        </p:spPr>
+        <p:style>
+          <a:lnRef idx="2">
+            <a:schemeClr val="accent1">
+              <a:shade val="50000"/>
+            </a:schemeClr>
+          </a:lnRef>
+          <a:fillRef idx="1">
+            <a:schemeClr val="accent1"/>
+          </a:fillRef>
+          <a:effectRef idx="0">
+            <a:schemeClr val="accent1"/>
+          </a:effectRef>
+          <a:fontRef idx="minor">
+            <a:schemeClr val="lt1"/>
+          </a:fontRef>
+        </p:style>
+        <p:txBody>
+          <a:bodyPr rtlCol="0" anchor="ctr"/>
+          <a:lstStyle/>
+          <a:p>
+            <a:pPr algn="ctr"/>
+            <a:endParaRPr lang="en-US"/>
+          </a:p>
+        </p:txBody>
+      </p:sp>
+      <p:sp>
+        <p:nvSpPr>
           <p:cNvPr id="2" name="Title 1">
             <a:extLst>
               <a:ext uri="{FF2B5EF4-FFF2-40B4-BE49-F238E27FC236}">
-                <a16:creationId xmlns:a16="http://schemas.microsoft.com/office/drawing/2014/main" id="{42153B5F-A1E5-4F51-AC8A-9B3C5E6154CB}"/>
+                <a16:creationId xmlns:a16="http://schemas.microsoft.com/office/drawing/2014/main" id="{CCB641FC-B164-4E97-B6D7-989EBB976D46}"/>
               </a:ext>
             </a:extLst>
           </p:cNvPr>
@@ -3633,14 +4227,165 @@
             <p:ph type="title"/>
           </p:nvPr>
         </p:nvSpPr>
-        <p:spPr/>
-        <p:txBody>
-          <a:bodyPr/>
-          <a:lstStyle/>
-          <a:p>
-            <a:r>
-              <a:rPr lang="en-US" dirty="0"/>
-              <a:t>Why It Should Not Be Used</a:t>
+        <p:spPr>
+          <a:xfrm>
+            <a:off x="1220892" y="321732"/>
+            <a:ext cx="9733620" cy="878397"/>
+          </a:xfrm>
+          <a:noFill/>
+        </p:spPr>
+        <p:txBody>
+          <a:bodyPr anchor="ctr">
+            <a:noAutofit/>
+          </a:bodyPr>
+          <a:lstStyle/>
+          <a:p>
+            <a:r>
+              <a:rPr lang="en-US" sz="3200" dirty="0">
+                <a:solidFill>
+                  <a:srgbClr val="FFFFFF"/>
+                </a:solidFill>
+              </a:rPr>
+              <a:t>Why It Should Not Be Used In Large Applications</a:t>
+            </a:r>
+          </a:p>
+        </p:txBody>
+      </p:sp>
+      <p:sp>
+        <p:nvSpPr>
+          <p:cNvPr id="12" name="Rectangle 11">
+            <a:extLst>
+              <a:ext uri="{FF2B5EF4-FFF2-40B4-BE49-F238E27FC236}">
+                <a16:creationId xmlns:a16="http://schemas.microsoft.com/office/drawing/2014/main" id="{D61E5C3D-6980-43E1-B38A-365BF0E6E3F3}"/>
+              </a:ext>
+              <a:ext uri="{C183D7F6-B498-43B3-948B-1728B52AA6E4}">
+                <adec:decorative xmlns:adec="http://schemas.microsoft.com/office/drawing/2017/decorative" val="1"/>
+              </a:ext>
+            </a:extLst>
+          </p:cNvPr>
+          <p:cNvSpPr>
+            <a:spLocks noGrp="1" noRot="1" noChangeAspect="1" noMove="1" noResize="1" noEditPoints="1" noAdjustHandles="1" noChangeArrowheads="1" noChangeShapeType="1" noTextEdit="1"/>
+          </p:cNvSpPr>
+          <p:nvPr>
+            <p:extLst>
+              <p:ext uri="{386F3935-93C4-4BCD-93E2-E3B085C9AB24}">
+                <p16:designElem xmlns:p16="http://schemas.microsoft.com/office/powerpoint/2015/main" val="1"/>
+              </p:ext>
+            </p:extLst>
+          </p:nvPr>
+        </p:nvSpPr>
+        <p:spPr>
+          <a:xfrm>
+            <a:off x="0" y="-2811"/>
+            <a:ext cx="899160" cy="6858000"/>
+          </a:xfrm>
+          <a:prstGeom prst="rect">
+            <a:avLst/>
+          </a:prstGeom>
+          <a:solidFill>
+            <a:schemeClr val="tx2">
+              <a:lumMod val="75000"/>
+            </a:schemeClr>
+          </a:solidFill>
+          <a:ln>
+            <a:noFill/>
+          </a:ln>
+        </p:spPr>
+        <p:style>
+          <a:lnRef idx="2">
+            <a:schemeClr val="accent1">
+              <a:shade val="50000"/>
+            </a:schemeClr>
+          </a:lnRef>
+          <a:fillRef idx="1">
+            <a:schemeClr val="accent1"/>
+          </a:fillRef>
+          <a:effectRef idx="0">
+            <a:schemeClr val="accent1"/>
+          </a:effectRef>
+          <a:fontRef idx="minor">
+            <a:schemeClr val="lt1"/>
+          </a:fontRef>
+        </p:style>
+        <p:txBody>
+          <a:bodyPr rtlCol="0" anchor="ctr"/>
+          <a:lstStyle/>
+          <a:p>
+            <a:pPr algn="ctr"/>
+            <a:endParaRPr lang="en-US"/>
+          </a:p>
+        </p:txBody>
+      </p:sp>
+      <p:sp>
+        <p:nvSpPr>
+          <p:cNvPr id="3" name="Content Placeholder 2">
+            <a:extLst>
+              <a:ext uri="{FF2B5EF4-FFF2-40B4-BE49-F238E27FC236}">
+                <a16:creationId xmlns:a16="http://schemas.microsoft.com/office/drawing/2014/main" id="{10A3F4B8-C6DC-42F4-A598-45F97634224F}"/>
+              </a:ext>
+            </a:extLst>
+          </p:cNvPr>
+          <p:cNvSpPr>
+            <a:spLocks noGrp="1"/>
+          </p:cNvSpPr>
+          <p:nvPr>
+            <p:ph idx="1"/>
+          </p:nvPr>
+        </p:nvSpPr>
+        <p:spPr>
+          <a:xfrm>
+            <a:off x="1220892" y="1828800"/>
+            <a:ext cx="9733620" cy="4351337"/>
+          </a:xfrm>
+        </p:spPr>
+        <p:txBody>
+          <a:bodyPr>
+            <a:normAutofit/>
+          </a:bodyPr>
+          <a:lstStyle/>
+          <a:p>
+            <a:pPr>
+              <a:lnSpc>
+                <a:spcPct val="200000"/>
+              </a:lnSpc>
+            </a:pPr>
+            <a:r>
+              <a:rPr lang="en-US" sz="2400" dirty="0">
+                <a:solidFill>
+                  <a:srgbClr val="FFFFFF"/>
+                </a:solidFill>
+              </a:rPr>
+              <a:t>VERY messy and hard to read and/or understand</a:t>
+            </a:r>
+          </a:p>
+          <a:p>
+            <a:pPr>
+              <a:lnSpc>
+                <a:spcPct val="200000"/>
+              </a:lnSpc>
+            </a:pPr>
+            <a:r>
+              <a:rPr lang="en-US" sz="2400" dirty="0">
+                <a:solidFill>
+                  <a:srgbClr val="FFFFFF"/>
+                </a:solidFill>
+              </a:rPr>
+              <a:t>Difficult to maintain</a:t>
+            </a:r>
+          </a:p>
+          <a:p>
+            <a:pPr>
+              <a:lnSpc>
+                <a:spcPct val="200000"/>
+              </a:lnSpc>
+            </a:pPr>
+            <a:r>
+              <a:rPr lang="en-US" sz="2400" dirty="0">
+                <a:solidFill>
+                  <a:srgbClr val="FFFFFF"/>
+                </a:solidFill>
+              </a:rPr>
+              <a:t>Steep learning curve</a:t>
             </a:r>
           </a:p>
         </p:txBody>
@@ -3648,7 +4393,7 @@
     </p:spTree>
     <p:extLst>
       <p:ext uri="{BB962C8B-B14F-4D97-AF65-F5344CB8AC3E}">
-        <p14:creationId xmlns:p14="http://schemas.microsoft.com/office/powerpoint/2010/main" val="3146635665"/>
+        <p14:creationId xmlns:p14="http://schemas.microsoft.com/office/powerpoint/2010/main" val="2088999938"/>
       </p:ext>
     </p:extLst>
   </p:cSld>
@@ -3661,6 +4406,14 @@
 <file path=ppt/slides/slide4.xml><?xml version="1.0" encoding="utf-8"?>
 <p:sld xmlns:a="http://schemas.openxmlformats.org/drawingml/2006/main" xmlns:r="http://schemas.openxmlformats.org/officeDocument/2006/relationships" xmlns:p="http://schemas.openxmlformats.org/presentationml/2006/main">
   <p:cSld>
+    <p:bg>
+      <p:bgPr>
+        <a:solidFill>
+          <a:schemeClr val="bg1"/>
+        </a:solidFill>
+        <a:effectLst/>
+      </p:bgPr>
+    </p:bg>
     <p:spTree>
       <p:nvGrpSpPr>
         <p:cNvPr id="1" name=""/>
@@ -3677,10 +4430,138 @@
       </p:grpSpPr>
       <p:sp>
         <p:nvSpPr>
+          <p:cNvPr id="8" name="Rectangle 7">
+            <a:extLst>
+              <a:ext uri="{FF2B5EF4-FFF2-40B4-BE49-F238E27FC236}">
+                <a16:creationId xmlns:a16="http://schemas.microsoft.com/office/drawing/2014/main" id="{F112E318-8843-4FBA-9CB8-AC44622DE78F}"/>
+              </a:ext>
+              <a:ext uri="{C183D7F6-B498-43B3-948B-1728B52AA6E4}">
+                <adec:decorative xmlns:adec="http://schemas.microsoft.com/office/drawing/2017/decorative" val="1"/>
+              </a:ext>
+            </a:extLst>
+          </p:cNvPr>
+          <p:cNvSpPr>
+            <a:spLocks noGrp="1" noRot="1" noChangeAspect="1" noMove="1" noResize="1" noEditPoints="1" noAdjustHandles="1" noChangeArrowheads="1" noChangeShapeType="1" noTextEdit="1"/>
+          </p:cNvSpPr>
+          <p:nvPr>
+            <p:extLst>
+              <p:ext uri="{386F3935-93C4-4BCD-93E2-E3B085C9AB24}">
+                <p16:designElem xmlns:p16="http://schemas.microsoft.com/office/powerpoint/2015/main" val="1"/>
+              </p:ext>
+            </p:extLst>
+          </p:nvPr>
+        </p:nvSpPr>
+        <p:spPr>
+          <a:xfrm>
+            <a:off x="0" y="0"/>
+            <a:ext cx="11292840" cy="6858000"/>
+          </a:xfrm>
+          <a:prstGeom prst="rect">
+            <a:avLst/>
+          </a:prstGeom>
+          <a:solidFill>
+            <a:srgbClr val="FFFFFF"/>
+          </a:solidFill>
+          <a:ln>
+            <a:noFill/>
+          </a:ln>
+        </p:spPr>
+        <p:style>
+          <a:lnRef idx="2">
+            <a:schemeClr val="accent1">
+              <a:shade val="50000"/>
+            </a:schemeClr>
+          </a:lnRef>
+          <a:fillRef idx="1">
+            <a:schemeClr val="accent1"/>
+          </a:fillRef>
+          <a:effectRef idx="0">
+            <a:schemeClr val="accent1"/>
+          </a:effectRef>
+          <a:fontRef idx="minor">
+            <a:schemeClr val="lt1"/>
+          </a:fontRef>
+        </p:style>
+        <p:txBody>
+          <a:bodyPr rtlCol="0" anchor="ctr"/>
+          <a:lstStyle/>
+          <a:p>
+            <a:pPr algn="ctr"/>
+            <a:endParaRPr lang="en-US"/>
+          </a:p>
+        </p:txBody>
+      </p:sp>
+      <p:sp>
+        <p:nvSpPr>
+          <p:cNvPr id="10" name="Rectangle 9">
+            <a:extLst>
+              <a:ext uri="{FF2B5EF4-FFF2-40B4-BE49-F238E27FC236}">
+                <a16:creationId xmlns:a16="http://schemas.microsoft.com/office/drawing/2014/main" id="{095418D5-11A6-457F-8BCD-5160B33D6935}"/>
+              </a:ext>
+              <a:ext uri="{C183D7F6-B498-43B3-948B-1728B52AA6E4}">
+                <adec:decorative xmlns:adec="http://schemas.microsoft.com/office/drawing/2017/decorative" val="1"/>
+              </a:ext>
+            </a:extLst>
+          </p:cNvPr>
+          <p:cNvSpPr>
+            <a:spLocks noGrp="1" noRot="1" noChangeAspect="1" noMove="1" noResize="1" noEditPoints="1" noAdjustHandles="1" noChangeArrowheads="1" noChangeShapeType="1" noTextEdit="1"/>
+          </p:cNvSpPr>
+          <p:nvPr>
+            <p:extLst>
+              <p:ext uri="{386F3935-93C4-4BCD-93E2-E3B085C9AB24}">
+                <p16:designElem xmlns:p16="http://schemas.microsoft.com/office/powerpoint/2015/main" val="1"/>
+              </p:ext>
+            </p:extLst>
+          </p:nvPr>
+        </p:nvSpPr>
+        <p:spPr>
+          <a:xfrm>
+            <a:off x="899160" y="0"/>
+            <a:ext cx="10393679" cy="6858000"/>
+          </a:xfrm>
+          <a:prstGeom prst="rect">
+            <a:avLst/>
+          </a:prstGeom>
+          <a:solidFill>
+            <a:schemeClr val="tx2">
+              <a:lumMod val="50000"/>
+            </a:schemeClr>
+          </a:solidFill>
+          <a:ln>
+            <a:noFill/>
+          </a:ln>
+        </p:spPr>
+        <p:style>
+          <a:lnRef idx="2">
+            <a:schemeClr val="accent1">
+              <a:shade val="50000"/>
+            </a:schemeClr>
+          </a:lnRef>
+          <a:fillRef idx="1">
+            <a:schemeClr val="accent1"/>
+          </a:fillRef>
+          <a:effectRef idx="0">
+            <a:schemeClr val="accent1"/>
+          </a:effectRef>
+          <a:fontRef idx="minor">
+            <a:schemeClr val="lt1"/>
+          </a:fontRef>
+        </p:style>
+        <p:txBody>
+          <a:bodyPr rtlCol="0" anchor="ctr"/>
+          <a:lstStyle/>
+          <a:p>
+            <a:pPr algn="ctr"/>
+            <a:endParaRPr lang="en-US"/>
+          </a:p>
+        </p:txBody>
+      </p:sp>
+      <p:sp>
+        <p:nvSpPr>
           <p:cNvPr id="2" name="Title 1">
             <a:extLst>
               <a:ext uri="{FF2B5EF4-FFF2-40B4-BE49-F238E27FC236}">
-                <a16:creationId xmlns:a16="http://schemas.microsoft.com/office/drawing/2014/main" id="{10B7CE04-7475-4FB5-A08A-E0D221876C5A}"/>
+                <a16:creationId xmlns:a16="http://schemas.microsoft.com/office/drawing/2014/main" id="{CCB641FC-B164-4E97-B6D7-989EBB976D46}"/>
               </a:ext>
             </a:extLst>
           </p:cNvPr>
@@ -3691,14 +4572,150 @@
             <p:ph type="title"/>
           </p:nvPr>
         </p:nvSpPr>
-        <p:spPr/>
-        <p:txBody>
-          <a:bodyPr/>
-          <a:lstStyle/>
-          <a:p>
-            <a:r>
-              <a:rPr lang="en-US" dirty="0"/>
+        <p:spPr>
+          <a:xfrm>
+            <a:off x="1220892" y="321732"/>
+            <a:ext cx="9733620" cy="878397"/>
+          </a:xfrm>
+          <a:noFill/>
+        </p:spPr>
+        <p:txBody>
+          <a:bodyPr anchor="ctr">
+            <a:normAutofit/>
+          </a:bodyPr>
+          <a:lstStyle/>
+          <a:p>
+            <a:r>
+              <a:rPr lang="en-US" sz="4000">
+                <a:solidFill>
+                  <a:srgbClr val="FFFFFF"/>
+                </a:solidFill>
+              </a:rPr>
               <a:t>Where It Is Commonly Used</a:t>
+            </a:r>
+          </a:p>
+        </p:txBody>
+      </p:sp>
+      <p:sp>
+        <p:nvSpPr>
+          <p:cNvPr id="12" name="Rectangle 11">
+            <a:extLst>
+              <a:ext uri="{FF2B5EF4-FFF2-40B4-BE49-F238E27FC236}">
+                <a16:creationId xmlns:a16="http://schemas.microsoft.com/office/drawing/2014/main" id="{D61E5C3D-6980-43E1-B38A-365BF0E6E3F3}"/>
+              </a:ext>
+              <a:ext uri="{C183D7F6-B498-43B3-948B-1728B52AA6E4}">
+                <adec:decorative xmlns:adec="http://schemas.microsoft.com/office/drawing/2017/decorative" val="1"/>
+              </a:ext>
+            </a:extLst>
+          </p:cNvPr>
+          <p:cNvSpPr>
+            <a:spLocks noGrp="1" noRot="1" noChangeAspect="1" noMove="1" noResize="1" noEditPoints="1" noAdjustHandles="1" noChangeArrowheads="1" noChangeShapeType="1" noTextEdit="1"/>
+          </p:cNvSpPr>
+          <p:nvPr>
+            <p:extLst>
+              <p:ext uri="{386F3935-93C4-4BCD-93E2-E3B085C9AB24}">
+                <p16:designElem xmlns:p16="http://schemas.microsoft.com/office/powerpoint/2015/main" val="1"/>
+              </p:ext>
+            </p:extLst>
+          </p:nvPr>
+        </p:nvSpPr>
+        <p:spPr>
+          <a:xfrm>
+            <a:off x="0" y="-2811"/>
+            <a:ext cx="899160" cy="6858000"/>
+          </a:xfrm>
+          <a:prstGeom prst="rect">
+            <a:avLst/>
+          </a:prstGeom>
+          <a:solidFill>
+            <a:schemeClr val="tx2">
+              <a:lumMod val="75000"/>
+            </a:schemeClr>
+          </a:solidFill>
+          <a:ln>
+            <a:noFill/>
+          </a:ln>
+        </p:spPr>
+        <p:style>
+          <a:lnRef idx="2">
+            <a:schemeClr val="accent1">
+              <a:shade val="50000"/>
+            </a:schemeClr>
+          </a:lnRef>
+          <a:fillRef idx="1">
+            <a:schemeClr val="accent1"/>
+          </a:fillRef>
+          <a:effectRef idx="0">
+            <a:schemeClr val="accent1"/>
+          </a:effectRef>
+          <a:fontRef idx="minor">
+            <a:schemeClr val="lt1"/>
+          </a:fontRef>
+        </p:style>
+        <p:txBody>
+          <a:bodyPr rtlCol="0" anchor="ctr"/>
+          <a:lstStyle/>
+          <a:p>
+            <a:pPr algn="ctr"/>
+            <a:endParaRPr lang="en-US"/>
+          </a:p>
+        </p:txBody>
+      </p:sp>
+      <p:sp>
+        <p:nvSpPr>
+          <p:cNvPr id="3" name="Content Placeholder 2">
+            <a:extLst>
+              <a:ext uri="{FF2B5EF4-FFF2-40B4-BE49-F238E27FC236}">
+                <a16:creationId xmlns:a16="http://schemas.microsoft.com/office/drawing/2014/main" id="{10A3F4B8-C6DC-42F4-A598-45F97634224F}"/>
+              </a:ext>
+            </a:extLst>
+          </p:cNvPr>
+          <p:cNvSpPr>
+            <a:spLocks noGrp="1"/>
+          </p:cNvSpPr>
+          <p:nvPr>
+            <p:ph idx="1"/>
+          </p:nvPr>
+        </p:nvSpPr>
+        <p:spPr>
+          <a:xfrm>
+            <a:off x="1220892" y="1828800"/>
+            <a:ext cx="9733620" cy="4351337"/>
+          </a:xfrm>
+        </p:spPr>
+        <p:txBody>
+          <a:bodyPr>
+            <a:normAutofit/>
+          </a:bodyPr>
+          <a:lstStyle/>
+          <a:p>
+            <a:pPr>
+              <a:lnSpc>
+                <a:spcPct val="200000"/>
+              </a:lnSpc>
+            </a:pPr>
+            <a:r>
+              <a:rPr lang="en-US" sz="2400" dirty="0">
+                <a:solidFill>
+                  <a:srgbClr val="FFFFFF"/>
+                </a:solidFill>
+              </a:rPr>
+              <a:t>As a “patch” script to get something to work</a:t>
+            </a:r>
+          </a:p>
+          <a:p>
+            <a:pPr>
+              <a:lnSpc>
+                <a:spcPct val="200000"/>
+              </a:lnSpc>
+            </a:pPr>
+            <a:r>
+              <a:rPr lang="en-US" sz="2400" dirty="0">
+                <a:solidFill>
+                  <a:srgbClr val="FFFFFF"/>
+                </a:solidFill>
+              </a:rPr>
+              <a:t>Text Processing</a:t>
             </a:r>
           </a:p>
         </p:txBody>
@@ -3706,7 +4723,7 @@
     </p:spTree>
     <p:extLst>
       <p:ext uri="{BB962C8B-B14F-4D97-AF65-F5344CB8AC3E}">
-        <p14:creationId xmlns:p14="http://schemas.microsoft.com/office/powerpoint/2010/main" val="370582583"/>
+        <p14:creationId xmlns:p14="http://schemas.microsoft.com/office/powerpoint/2010/main" val="3232931802"/>
       </p:ext>
     </p:extLst>
   </p:cSld>
@@ -3719,6 +4736,14 @@
 <file path=ppt/slides/slide5.xml><?xml version="1.0" encoding="utf-8"?>
 <p:sld xmlns:a="http://schemas.openxmlformats.org/drawingml/2006/main" xmlns:r="http://schemas.openxmlformats.org/officeDocument/2006/relationships" xmlns:p="http://schemas.openxmlformats.org/presentationml/2006/main">
   <p:cSld>
+    <p:bg>
+      <p:bgPr>
+        <a:solidFill>
+          <a:schemeClr val="bg1"/>
+        </a:solidFill>
+        <a:effectLst/>
+      </p:bgPr>
+    </p:bg>
     <p:spTree>
       <p:nvGrpSpPr>
         <p:cNvPr id="1" name=""/>
@@ -3735,10 +4760,138 @@
       </p:grpSpPr>
       <p:sp>
         <p:nvSpPr>
+          <p:cNvPr id="8" name="Rectangle 7">
+            <a:extLst>
+              <a:ext uri="{FF2B5EF4-FFF2-40B4-BE49-F238E27FC236}">
+                <a16:creationId xmlns:a16="http://schemas.microsoft.com/office/drawing/2014/main" id="{F112E318-8843-4FBA-9CB8-AC44622DE78F}"/>
+              </a:ext>
+              <a:ext uri="{C183D7F6-B498-43B3-948B-1728B52AA6E4}">
+                <adec:decorative xmlns:adec="http://schemas.microsoft.com/office/drawing/2017/decorative" val="1"/>
+              </a:ext>
+            </a:extLst>
+          </p:cNvPr>
+          <p:cNvSpPr>
+            <a:spLocks noGrp="1" noRot="1" noChangeAspect="1" noMove="1" noResize="1" noEditPoints="1" noAdjustHandles="1" noChangeArrowheads="1" noChangeShapeType="1" noTextEdit="1"/>
+          </p:cNvSpPr>
+          <p:nvPr>
+            <p:extLst>
+              <p:ext uri="{386F3935-93C4-4BCD-93E2-E3B085C9AB24}">
+                <p16:designElem xmlns:p16="http://schemas.microsoft.com/office/powerpoint/2015/main" val="1"/>
+              </p:ext>
+            </p:extLst>
+          </p:nvPr>
+        </p:nvSpPr>
+        <p:spPr>
+          <a:xfrm>
+            <a:off x="0" y="0"/>
+            <a:ext cx="11292840" cy="6858000"/>
+          </a:xfrm>
+          <a:prstGeom prst="rect">
+            <a:avLst/>
+          </a:prstGeom>
+          <a:solidFill>
+            <a:srgbClr val="FFFFFF"/>
+          </a:solidFill>
+          <a:ln>
+            <a:noFill/>
+          </a:ln>
+        </p:spPr>
+        <p:style>
+          <a:lnRef idx="2">
+            <a:schemeClr val="accent1">
+              <a:shade val="50000"/>
+            </a:schemeClr>
+          </a:lnRef>
+          <a:fillRef idx="1">
+            <a:schemeClr val="accent1"/>
+          </a:fillRef>
+          <a:effectRef idx="0">
+            <a:schemeClr val="accent1"/>
+          </a:effectRef>
+          <a:fontRef idx="minor">
+            <a:schemeClr val="lt1"/>
+          </a:fontRef>
+        </p:style>
+        <p:txBody>
+          <a:bodyPr rtlCol="0" anchor="ctr"/>
+          <a:lstStyle/>
+          <a:p>
+            <a:pPr algn="ctr"/>
+            <a:endParaRPr lang="en-US"/>
+          </a:p>
+        </p:txBody>
+      </p:sp>
+      <p:sp>
+        <p:nvSpPr>
+          <p:cNvPr id="10" name="Rectangle 9">
+            <a:extLst>
+              <a:ext uri="{FF2B5EF4-FFF2-40B4-BE49-F238E27FC236}">
+                <a16:creationId xmlns:a16="http://schemas.microsoft.com/office/drawing/2014/main" id="{095418D5-11A6-457F-8BCD-5160B33D6935}"/>
+              </a:ext>
+              <a:ext uri="{C183D7F6-B498-43B3-948B-1728B52AA6E4}">
+                <adec:decorative xmlns:adec="http://schemas.microsoft.com/office/drawing/2017/decorative" val="1"/>
+              </a:ext>
+            </a:extLst>
+          </p:cNvPr>
+          <p:cNvSpPr>
+            <a:spLocks noGrp="1" noRot="1" noChangeAspect="1" noMove="1" noResize="1" noEditPoints="1" noAdjustHandles="1" noChangeArrowheads="1" noChangeShapeType="1" noTextEdit="1"/>
+          </p:cNvSpPr>
+          <p:nvPr>
+            <p:extLst>
+              <p:ext uri="{386F3935-93C4-4BCD-93E2-E3B085C9AB24}">
+                <p16:designElem xmlns:p16="http://schemas.microsoft.com/office/powerpoint/2015/main" val="1"/>
+              </p:ext>
+            </p:extLst>
+          </p:nvPr>
+        </p:nvSpPr>
+        <p:spPr>
+          <a:xfrm>
+            <a:off x="899160" y="0"/>
+            <a:ext cx="10393679" cy="6858000"/>
+          </a:xfrm>
+          <a:prstGeom prst="rect">
+            <a:avLst/>
+          </a:prstGeom>
+          <a:solidFill>
+            <a:schemeClr val="tx2">
+              <a:lumMod val="50000"/>
+            </a:schemeClr>
+          </a:solidFill>
+          <a:ln>
+            <a:noFill/>
+          </a:ln>
+        </p:spPr>
+        <p:style>
+          <a:lnRef idx="2">
+            <a:schemeClr val="accent1">
+              <a:shade val="50000"/>
+            </a:schemeClr>
+          </a:lnRef>
+          <a:fillRef idx="1">
+            <a:schemeClr val="accent1"/>
+          </a:fillRef>
+          <a:effectRef idx="0">
+            <a:schemeClr val="accent1"/>
+          </a:effectRef>
+          <a:fontRef idx="minor">
+            <a:schemeClr val="lt1"/>
+          </a:fontRef>
+        </p:style>
+        <p:txBody>
+          <a:bodyPr rtlCol="0" anchor="ctr"/>
+          <a:lstStyle/>
+          <a:p>
+            <a:pPr algn="ctr"/>
+            <a:endParaRPr lang="en-US"/>
+          </a:p>
+        </p:txBody>
+      </p:sp>
+      <p:sp>
+        <p:nvSpPr>
           <p:cNvPr id="2" name="Title 1">
             <a:extLst>
               <a:ext uri="{FF2B5EF4-FFF2-40B4-BE49-F238E27FC236}">
-                <a16:creationId xmlns:a16="http://schemas.microsoft.com/office/drawing/2014/main" id="{CC47F096-36BF-42EF-9D7A-55B674A6CB58}"/>
+                <a16:creationId xmlns:a16="http://schemas.microsoft.com/office/drawing/2014/main" id="{CCB641FC-B164-4E97-B6D7-989EBB976D46}"/>
               </a:ext>
             </a:extLst>
           </p:cNvPr>
@@ -3749,22 +4902,135 @@
             <p:ph type="title"/>
           </p:nvPr>
         </p:nvSpPr>
-        <p:spPr/>
-        <p:txBody>
-          <a:bodyPr/>
-          <a:lstStyle/>
-          <a:p>
-            <a:r>
-              <a:rPr lang="en-US" dirty="0"/>
+        <p:spPr>
+          <a:xfrm>
+            <a:off x="1220892" y="321732"/>
+            <a:ext cx="9733620" cy="878397"/>
+          </a:xfrm>
+          <a:noFill/>
+        </p:spPr>
+        <p:txBody>
+          <a:bodyPr anchor="ctr">
+            <a:normAutofit/>
+          </a:bodyPr>
+          <a:lstStyle/>
+          <a:p>
+            <a:r>
+              <a:rPr lang="en-US" sz="4000">
+                <a:solidFill>
+                  <a:srgbClr val="FFFFFF"/>
+                </a:solidFill>
+              </a:rPr>
               <a:t>Basic Usage</a:t>
             </a:r>
+          </a:p>
+        </p:txBody>
+      </p:sp>
+      <p:sp>
+        <p:nvSpPr>
+          <p:cNvPr id="12" name="Rectangle 11">
+            <a:extLst>
+              <a:ext uri="{FF2B5EF4-FFF2-40B4-BE49-F238E27FC236}">
+                <a16:creationId xmlns:a16="http://schemas.microsoft.com/office/drawing/2014/main" id="{D61E5C3D-6980-43E1-B38A-365BF0E6E3F3}"/>
+              </a:ext>
+              <a:ext uri="{C183D7F6-B498-43B3-948B-1728B52AA6E4}">
+                <adec:decorative xmlns:adec="http://schemas.microsoft.com/office/drawing/2017/decorative" val="1"/>
+              </a:ext>
+            </a:extLst>
+          </p:cNvPr>
+          <p:cNvSpPr>
+            <a:spLocks noGrp="1" noRot="1" noChangeAspect="1" noMove="1" noResize="1" noEditPoints="1" noAdjustHandles="1" noChangeArrowheads="1" noChangeShapeType="1" noTextEdit="1"/>
+          </p:cNvSpPr>
+          <p:nvPr>
+            <p:extLst>
+              <p:ext uri="{386F3935-93C4-4BCD-93E2-E3B085C9AB24}">
+                <p16:designElem xmlns:p16="http://schemas.microsoft.com/office/powerpoint/2015/main" val="1"/>
+              </p:ext>
+            </p:extLst>
+          </p:nvPr>
+        </p:nvSpPr>
+        <p:spPr>
+          <a:xfrm>
+            <a:off x="0" y="-2811"/>
+            <a:ext cx="899160" cy="6858000"/>
+          </a:xfrm>
+          <a:prstGeom prst="rect">
+            <a:avLst/>
+          </a:prstGeom>
+          <a:solidFill>
+            <a:schemeClr val="tx2">
+              <a:lumMod val="75000"/>
+            </a:schemeClr>
+          </a:solidFill>
+          <a:ln>
+            <a:noFill/>
+          </a:ln>
+        </p:spPr>
+        <p:style>
+          <a:lnRef idx="2">
+            <a:schemeClr val="accent1">
+              <a:shade val="50000"/>
+            </a:schemeClr>
+          </a:lnRef>
+          <a:fillRef idx="1">
+            <a:schemeClr val="accent1"/>
+          </a:fillRef>
+          <a:effectRef idx="0">
+            <a:schemeClr val="accent1"/>
+          </a:effectRef>
+          <a:fontRef idx="minor">
+            <a:schemeClr val="lt1"/>
+          </a:fontRef>
+        </p:style>
+        <p:txBody>
+          <a:bodyPr rtlCol="0" anchor="ctr"/>
+          <a:lstStyle/>
+          <a:p>
+            <a:pPr algn="ctr"/>
+            <a:endParaRPr lang="en-US"/>
+          </a:p>
+        </p:txBody>
+      </p:sp>
+      <p:sp>
+        <p:nvSpPr>
+          <p:cNvPr id="3" name="Content Placeholder 2">
+            <a:extLst>
+              <a:ext uri="{FF2B5EF4-FFF2-40B4-BE49-F238E27FC236}">
+                <a16:creationId xmlns:a16="http://schemas.microsoft.com/office/drawing/2014/main" id="{10A3F4B8-C6DC-42F4-A598-45F97634224F}"/>
+              </a:ext>
+            </a:extLst>
+          </p:cNvPr>
+          <p:cNvSpPr>
+            <a:spLocks noGrp="1"/>
+          </p:cNvSpPr>
+          <p:nvPr>
+            <p:ph idx="1"/>
+          </p:nvPr>
+        </p:nvSpPr>
+        <p:spPr>
+          <a:xfrm>
+            <a:off x="1220892" y="1828800"/>
+            <a:ext cx="9733620" cy="4351337"/>
+          </a:xfrm>
+        </p:spPr>
+        <p:txBody>
+          <a:bodyPr>
+            <a:normAutofit/>
+          </a:bodyPr>
+          <a:lstStyle/>
+          <a:p>
+            <a:endParaRPr lang="en-US" sz="2400">
+              <a:solidFill>
+                <a:srgbClr val="FFFFFF"/>
+              </a:solidFill>
+            </a:endParaRPr>
           </a:p>
         </p:txBody>
       </p:sp>
     </p:spTree>
     <p:extLst>
       <p:ext uri="{BB962C8B-B14F-4D97-AF65-F5344CB8AC3E}">
-        <p14:creationId xmlns:p14="http://schemas.microsoft.com/office/powerpoint/2010/main" val="1240929877"/>
+        <p14:creationId xmlns:p14="http://schemas.microsoft.com/office/powerpoint/2010/main" val="537501860"/>
       </p:ext>
     </p:extLst>
   </p:cSld>
@@ -3777,6 +5043,14 @@
 <file path=ppt/slides/slide6.xml><?xml version="1.0" encoding="utf-8"?>
 <p:sld xmlns:a="http://schemas.openxmlformats.org/drawingml/2006/main" xmlns:r="http://schemas.openxmlformats.org/officeDocument/2006/relationships" xmlns:p="http://schemas.openxmlformats.org/presentationml/2006/main">
   <p:cSld>
+    <p:bg>
+      <p:bgPr>
+        <a:solidFill>
+          <a:schemeClr val="bg1"/>
+        </a:solidFill>
+        <a:effectLst/>
+      </p:bgPr>
+    </p:bg>
     <p:spTree>
       <p:nvGrpSpPr>
         <p:cNvPr id="1" name=""/>
@@ -3793,10 +5067,138 @@
       </p:grpSpPr>
       <p:sp>
         <p:nvSpPr>
+          <p:cNvPr id="8" name="Rectangle 7">
+            <a:extLst>
+              <a:ext uri="{FF2B5EF4-FFF2-40B4-BE49-F238E27FC236}">
+                <a16:creationId xmlns:a16="http://schemas.microsoft.com/office/drawing/2014/main" id="{F112E318-8843-4FBA-9CB8-AC44622DE78F}"/>
+              </a:ext>
+              <a:ext uri="{C183D7F6-B498-43B3-948B-1728B52AA6E4}">
+                <adec:decorative xmlns:adec="http://schemas.microsoft.com/office/drawing/2017/decorative" val="1"/>
+              </a:ext>
+            </a:extLst>
+          </p:cNvPr>
+          <p:cNvSpPr>
+            <a:spLocks noGrp="1" noRot="1" noChangeAspect="1" noMove="1" noResize="1" noEditPoints="1" noAdjustHandles="1" noChangeArrowheads="1" noChangeShapeType="1" noTextEdit="1"/>
+          </p:cNvSpPr>
+          <p:nvPr>
+            <p:extLst>
+              <p:ext uri="{386F3935-93C4-4BCD-93E2-E3B085C9AB24}">
+                <p16:designElem xmlns:p16="http://schemas.microsoft.com/office/powerpoint/2015/main" val="1"/>
+              </p:ext>
+            </p:extLst>
+          </p:nvPr>
+        </p:nvSpPr>
+        <p:spPr>
+          <a:xfrm>
+            <a:off x="0" y="0"/>
+            <a:ext cx="11292840" cy="6858000"/>
+          </a:xfrm>
+          <a:prstGeom prst="rect">
+            <a:avLst/>
+          </a:prstGeom>
+          <a:solidFill>
+            <a:srgbClr val="FFFFFF"/>
+          </a:solidFill>
+          <a:ln>
+            <a:noFill/>
+          </a:ln>
+        </p:spPr>
+        <p:style>
+          <a:lnRef idx="2">
+            <a:schemeClr val="accent1">
+              <a:shade val="50000"/>
+            </a:schemeClr>
+          </a:lnRef>
+          <a:fillRef idx="1">
+            <a:schemeClr val="accent1"/>
+          </a:fillRef>
+          <a:effectRef idx="0">
+            <a:schemeClr val="accent1"/>
+          </a:effectRef>
+          <a:fontRef idx="minor">
+            <a:schemeClr val="lt1"/>
+          </a:fontRef>
+        </p:style>
+        <p:txBody>
+          <a:bodyPr rtlCol="0" anchor="ctr"/>
+          <a:lstStyle/>
+          <a:p>
+            <a:pPr algn="ctr"/>
+            <a:endParaRPr lang="en-US"/>
+          </a:p>
+        </p:txBody>
+      </p:sp>
+      <p:sp>
+        <p:nvSpPr>
+          <p:cNvPr id="10" name="Rectangle 9">
+            <a:extLst>
+              <a:ext uri="{FF2B5EF4-FFF2-40B4-BE49-F238E27FC236}">
+                <a16:creationId xmlns:a16="http://schemas.microsoft.com/office/drawing/2014/main" id="{095418D5-11A6-457F-8BCD-5160B33D6935}"/>
+              </a:ext>
+              <a:ext uri="{C183D7F6-B498-43B3-948B-1728B52AA6E4}">
+                <adec:decorative xmlns:adec="http://schemas.microsoft.com/office/drawing/2017/decorative" val="1"/>
+              </a:ext>
+            </a:extLst>
+          </p:cNvPr>
+          <p:cNvSpPr>
+            <a:spLocks noGrp="1" noRot="1" noChangeAspect="1" noMove="1" noResize="1" noEditPoints="1" noAdjustHandles="1" noChangeArrowheads="1" noChangeShapeType="1" noTextEdit="1"/>
+          </p:cNvSpPr>
+          <p:nvPr>
+            <p:extLst>
+              <p:ext uri="{386F3935-93C4-4BCD-93E2-E3B085C9AB24}">
+                <p16:designElem xmlns:p16="http://schemas.microsoft.com/office/powerpoint/2015/main" val="1"/>
+              </p:ext>
+            </p:extLst>
+          </p:nvPr>
+        </p:nvSpPr>
+        <p:spPr>
+          <a:xfrm>
+            <a:off x="899160" y="0"/>
+            <a:ext cx="10393679" cy="6858000"/>
+          </a:xfrm>
+          <a:prstGeom prst="rect">
+            <a:avLst/>
+          </a:prstGeom>
+          <a:solidFill>
+            <a:schemeClr val="tx2">
+              <a:lumMod val="50000"/>
+            </a:schemeClr>
+          </a:solidFill>
+          <a:ln>
+            <a:noFill/>
+          </a:ln>
+        </p:spPr>
+        <p:style>
+          <a:lnRef idx="2">
+            <a:schemeClr val="accent1">
+              <a:shade val="50000"/>
+            </a:schemeClr>
+          </a:lnRef>
+          <a:fillRef idx="1">
+            <a:schemeClr val="accent1"/>
+          </a:fillRef>
+          <a:effectRef idx="0">
+            <a:schemeClr val="accent1"/>
+          </a:effectRef>
+          <a:fontRef idx="minor">
+            <a:schemeClr val="lt1"/>
+          </a:fontRef>
+        </p:style>
+        <p:txBody>
+          <a:bodyPr rtlCol="0" anchor="ctr"/>
+          <a:lstStyle/>
+          <a:p>
+            <a:pPr algn="ctr"/>
+            <a:endParaRPr lang="en-US"/>
+          </a:p>
+        </p:txBody>
+      </p:sp>
+      <p:sp>
+        <p:nvSpPr>
           <p:cNvPr id="2" name="Title 1">
             <a:extLst>
               <a:ext uri="{FF2B5EF4-FFF2-40B4-BE49-F238E27FC236}">
-                <a16:creationId xmlns:a16="http://schemas.microsoft.com/office/drawing/2014/main" id="{2E0BE0C5-8DEF-400E-BD45-161CED5718ED}"/>
+                <a16:creationId xmlns:a16="http://schemas.microsoft.com/office/drawing/2014/main" id="{CCB641FC-B164-4E97-B6D7-989EBB976D46}"/>
               </a:ext>
             </a:extLst>
           </p:cNvPr>
@@ -3807,22 +5209,135 @@
             <p:ph type="title"/>
           </p:nvPr>
         </p:nvSpPr>
-        <p:spPr/>
-        <p:txBody>
-          <a:bodyPr/>
-          <a:lstStyle/>
-          <a:p>
-            <a:r>
-              <a:rPr lang="en-US" dirty="0"/>
+        <p:spPr>
+          <a:xfrm>
+            <a:off x="1220892" y="321732"/>
+            <a:ext cx="9733620" cy="878397"/>
+          </a:xfrm>
+          <a:noFill/>
+        </p:spPr>
+        <p:txBody>
+          <a:bodyPr anchor="ctr">
+            <a:normAutofit/>
+          </a:bodyPr>
+          <a:lstStyle/>
+          <a:p>
+            <a:r>
+              <a:rPr lang="en-US" sz="4000">
+                <a:solidFill>
+                  <a:srgbClr val="FFFFFF"/>
+                </a:solidFill>
+              </a:rPr>
               <a:t>The Problem</a:t>
             </a:r>
+          </a:p>
+        </p:txBody>
+      </p:sp>
+      <p:sp>
+        <p:nvSpPr>
+          <p:cNvPr id="12" name="Rectangle 11">
+            <a:extLst>
+              <a:ext uri="{FF2B5EF4-FFF2-40B4-BE49-F238E27FC236}">
+                <a16:creationId xmlns:a16="http://schemas.microsoft.com/office/drawing/2014/main" id="{D61E5C3D-6980-43E1-B38A-365BF0E6E3F3}"/>
+              </a:ext>
+              <a:ext uri="{C183D7F6-B498-43B3-948B-1728B52AA6E4}">
+                <adec:decorative xmlns:adec="http://schemas.microsoft.com/office/drawing/2017/decorative" val="1"/>
+              </a:ext>
+            </a:extLst>
+          </p:cNvPr>
+          <p:cNvSpPr>
+            <a:spLocks noGrp="1" noRot="1" noChangeAspect="1" noMove="1" noResize="1" noEditPoints="1" noAdjustHandles="1" noChangeArrowheads="1" noChangeShapeType="1" noTextEdit="1"/>
+          </p:cNvSpPr>
+          <p:nvPr>
+            <p:extLst>
+              <p:ext uri="{386F3935-93C4-4BCD-93E2-E3B085C9AB24}">
+                <p16:designElem xmlns:p16="http://schemas.microsoft.com/office/powerpoint/2015/main" val="1"/>
+              </p:ext>
+            </p:extLst>
+          </p:nvPr>
+        </p:nvSpPr>
+        <p:spPr>
+          <a:xfrm>
+            <a:off x="0" y="-2811"/>
+            <a:ext cx="899160" cy="6858000"/>
+          </a:xfrm>
+          <a:prstGeom prst="rect">
+            <a:avLst/>
+          </a:prstGeom>
+          <a:solidFill>
+            <a:schemeClr val="tx2">
+              <a:lumMod val="75000"/>
+            </a:schemeClr>
+          </a:solidFill>
+          <a:ln>
+            <a:noFill/>
+          </a:ln>
+        </p:spPr>
+        <p:style>
+          <a:lnRef idx="2">
+            <a:schemeClr val="accent1">
+              <a:shade val="50000"/>
+            </a:schemeClr>
+          </a:lnRef>
+          <a:fillRef idx="1">
+            <a:schemeClr val="accent1"/>
+          </a:fillRef>
+          <a:effectRef idx="0">
+            <a:schemeClr val="accent1"/>
+          </a:effectRef>
+          <a:fontRef idx="minor">
+            <a:schemeClr val="lt1"/>
+          </a:fontRef>
+        </p:style>
+        <p:txBody>
+          <a:bodyPr rtlCol="0" anchor="ctr"/>
+          <a:lstStyle/>
+          <a:p>
+            <a:pPr algn="ctr"/>
+            <a:endParaRPr lang="en-US"/>
+          </a:p>
+        </p:txBody>
+      </p:sp>
+      <p:sp>
+        <p:nvSpPr>
+          <p:cNvPr id="3" name="Content Placeholder 2">
+            <a:extLst>
+              <a:ext uri="{FF2B5EF4-FFF2-40B4-BE49-F238E27FC236}">
+                <a16:creationId xmlns:a16="http://schemas.microsoft.com/office/drawing/2014/main" id="{10A3F4B8-C6DC-42F4-A598-45F97634224F}"/>
+              </a:ext>
+            </a:extLst>
+          </p:cNvPr>
+          <p:cNvSpPr>
+            <a:spLocks noGrp="1"/>
+          </p:cNvSpPr>
+          <p:nvPr>
+            <p:ph idx="1"/>
+          </p:nvPr>
+        </p:nvSpPr>
+        <p:spPr>
+          <a:xfrm>
+            <a:off x="1220892" y="1828800"/>
+            <a:ext cx="9733620" cy="4351337"/>
+          </a:xfrm>
+        </p:spPr>
+        <p:txBody>
+          <a:bodyPr>
+            <a:normAutofit/>
+          </a:bodyPr>
+          <a:lstStyle/>
+          <a:p>
+            <a:endParaRPr lang="en-US" sz="2400">
+              <a:solidFill>
+                <a:srgbClr val="FFFFFF"/>
+              </a:solidFill>
+            </a:endParaRPr>
           </a:p>
         </p:txBody>
       </p:sp>
     </p:spTree>
     <p:extLst>
       <p:ext uri="{BB962C8B-B14F-4D97-AF65-F5344CB8AC3E}">
-        <p14:creationId xmlns:p14="http://schemas.microsoft.com/office/powerpoint/2010/main" val="1574178620"/>
+        <p14:creationId xmlns:p14="http://schemas.microsoft.com/office/powerpoint/2010/main" val="655156645"/>
       </p:ext>
     </p:extLst>
   </p:cSld>
@@ -3835,6 +5350,14 @@
 <file path=ppt/slides/slide7.xml><?xml version="1.0" encoding="utf-8"?>
 <p:sld xmlns:a="http://schemas.openxmlformats.org/drawingml/2006/main" xmlns:r="http://schemas.openxmlformats.org/officeDocument/2006/relationships" xmlns:p="http://schemas.openxmlformats.org/presentationml/2006/main">
   <p:cSld>
+    <p:bg>
+      <p:bgPr>
+        <a:solidFill>
+          <a:schemeClr val="bg1"/>
+        </a:solidFill>
+        <a:effectLst/>
+      </p:bgPr>
+    </p:bg>
     <p:spTree>
       <p:nvGrpSpPr>
         <p:cNvPr id="1" name=""/>
@@ -3851,10 +5374,138 @@
       </p:grpSpPr>
       <p:sp>
         <p:nvSpPr>
+          <p:cNvPr id="8" name="Rectangle 7">
+            <a:extLst>
+              <a:ext uri="{FF2B5EF4-FFF2-40B4-BE49-F238E27FC236}">
+                <a16:creationId xmlns:a16="http://schemas.microsoft.com/office/drawing/2014/main" id="{F112E318-8843-4FBA-9CB8-AC44622DE78F}"/>
+              </a:ext>
+              <a:ext uri="{C183D7F6-B498-43B3-948B-1728B52AA6E4}">
+                <adec:decorative xmlns:adec="http://schemas.microsoft.com/office/drawing/2017/decorative" val="1"/>
+              </a:ext>
+            </a:extLst>
+          </p:cNvPr>
+          <p:cNvSpPr>
+            <a:spLocks noGrp="1" noRot="1" noChangeAspect="1" noMove="1" noResize="1" noEditPoints="1" noAdjustHandles="1" noChangeArrowheads="1" noChangeShapeType="1" noTextEdit="1"/>
+          </p:cNvSpPr>
+          <p:nvPr>
+            <p:extLst>
+              <p:ext uri="{386F3935-93C4-4BCD-93E2-E3B085C9AB24}">
+                <p16:designElem xmlns:p16="http://schemas.microsoft.com/office/powerpoint/2015/main" val="1"/>
+              </p:ext>
+            </p:extLst>
+          </p:nvPr>
+        </p:nvSpPr>
+        <p:spPr>
+          <a:xfrm>
+            <a:off x="0" y="0"/>
+            <a:ext cx="11292840" cy="6858000"/>
+          </a:xfrm>
+          <a:prstGeom prst="rect">
+            <a:avLst/>
+          </a:prstGeom>
+          <a:solidFill>
+            <a:srgbClr val="FFFFFF"/>
+          </a:solidFill>
+          <a:ln>
+            <a:noFill/>
+          </a:ln>
+        </p:spPr>
+        <p:style>
+          <a:lnRef idx="2">
+            <a:schemeClr val="accent1">
+              <a:shade val="50000"/>
+            </a:schemeClr>
+          </a:lnRef>
+          <a:fillRef idx="1">
+            <a:schemeClr val="accent1"/>
+          </a:fillRef>
+          <a:effectRef idx="0">
+            <a:schemeClr val="accent1"/>
+          </a:effectRef>
+          <a:fontRef idx="minor">
+            <a:schemeClr val="lt1"/>
+          </a:fontRef>
+        </p:style>
+        <p:txBody>
+          <a:bodyPr rtlCol="0" anchor="ctr"/>
+          <a:lstStyle/>
+          <a:p>
+            <a:pPr algn="ctr"/>
+            <a:endParaRPr lang="en-US"/>
+          </a:p>
+        </p:txBody>
+      </p:sp>
+      <p:sp>
+        <p:nvSpPr>
+          <p:cNvPr id="10" name="Rectangle 9">
+            <a:extLst>
+              <a:ext uri="{FF2B5EF4-FFF2-40B4-BE49-F238E27FC236}">
+                <a16:creationId xmlns:a16="http://schemas.microsoft.com/office/drawing/2014/main" id="{095418D5-11A6-457F-8BCD-5160B33D6935}"/>
+              </a:ext>
+              <a:ext uri="{C183D7F6-B498-43B3-948B-1728B52AA6E4}">
+                <adec:decorative xmlns:adec="http://schemas.microsoft.com/office/drawing/2017/decorative" val="1"/>
+              </a:ext>
+            </a:extLst>
+          </p:cNvPr>
+          <p:cNvSpPr>
+            <a:spLocks noGrp="1" noRot="1" noChangeAspect="1" noMove="1" noResize="1" noEditPoints="1" noAdjustHandles="1" noChangeArrowheads="1" noChangeShapeType="1" noTextEdit="1"/>
+          </p:cNvSpPr>
+          <p:nvPr>
+            <p:extLst>
+              <p:ext uri="{386F3935-93C4-4BCD-93E2-E3B085C9AB24}">
+                <p16:designElem xmlns:p16="http://schemas.microsoft.com/office/powerpoint/2015/main" val="1"/>
+              </p:ext>
+            </p:extLst>
+          </p:nvPr>
+        </p:nvSpPr>
+        <p:spPr>
+          <a:xfrm>
+            <a:off x="899160" y="0"/>
+            <a:ext cx="10393679" cy="6858000"/>
+          </a:xfrm>
+          <a:prstGeom prst="rect">
+            <a:avLst/>
+          </a:prstGeom>
+          <a:solidFill>
+            <a:schemeClr val="tx2">
+              <a:lumMod val="50000"/>
+            </a:schemeClr>
+          </a:solidFill>
+          <a:ln>
+            <a:noFill/>
+          </a:ln>
+        </p:spPr>
+        <p:style>
+          <a:lnRef idx="2">
+            <a:schemeClr val="accent1">
+              <a:shade val="50000"/>
+            </a:schemeClr>
+          </a:lnRef>
+          <a:fillRef idx="1">
+            <a:schemeClr val="accent1"/>
+          </a:fillRef>
+          <a:effectRef idx="0">
+            <a:schemeClr val="accent1"/>
+          </a:effectRef>
+          <a:fontRef idx="minor">
+            <a:schemeClr val="lt1"/>
+          </a:fontRef>
+        </p:style>
+        <p:txBody>
+          <a:bodyPr rtlCol="0" anchor="ctr"/>
+          <a:lstStyle/>
+          <a:p>
+            <a:pPr algn="ctr"/>
+            <a:endParaRPr lang="en-US"/>
+          </a:p>
+        </p:txBody>
+      </p:sp>
+      <p:sp>
+        <p:nvSpPr>
           <p:cNvPr id="2" name="Title 1">
             <a:extLst>
               <a:ext uri="{FF2B5EF4-FFF2-40B4-BE49-F238E27FC236}">
-                <a16:creationId xmlns:a16="http://schemas.microsoft.com/office/drawing/2014/main" id="{6100268B-35FB-49D6-86E3-32EF324A6AC8}"/>
+                <a16:creationId xmlns:a16="http://schemas.microsoft.com/office/drawing/2014/main" id="{CCB641FC-B164-4E97-B6D7-989EBB976D46}"/>
               </a:ext>
             </a:extLst>
           </p:cNvPr>
@@ -3867,25 +5518,133 @@
         </p:nvSpPr>
         <p:spPr>
           <a:xfrm>
-            <a:off x="640080" y="365760"/>
-            <a:ext cx="10314432" cy="1325562"/>
-          </a:xfrm>
-        </p:spPr>
-        <p:txBody>
-          <a:bodyPr/>
-          <a:lstStyle/>
-          <a:p>
-            <a:r>
-              <a:rPr lang="en-US" dirty="0"/>
+            <a:off x="1220892" y="321732"/>
+            <a:ext cx="9733620" cy="878397"/>
+          </a:xfrm>
+          <a:noFill/>
+        </p:spPr>
+        <p:txBody>
+          <a:bodyPr anchor="ctr">
+            <a:normAutofit/>
+          </a:bodyPr>
+          <a:lstStyle/>
+          <a:p>
+            <a:r>
+              <a:rPr lang="en-US" sz="4000">
+                <a:solidFill>
+                  <a:srgbClr val="FFFFFF"/>
+                </a:solidFill>
+              </a:rPr>
               <a:t>Why It Is Good At Solving The Problem</a:t>
             </a:r>
+          </a:p>
+        </p:txBody>
+      </p:sp>
+      <p:sp>
+        <p:nvSpPr>
+          <p:cNvPr id="12" name="Rectangle 11">
+            <a:extLst>
+              <a:ext uri="{FF2B5EF4-FFF2-40B4-BE49-F238E27FC236}">
+                <a16:creationId xmlns:a16="http://schemas.microsoft.com/office/drawing/2014/main" id="{D61E5C3D-6980-43E1-B38A-365BF0E6E3F3}"/>
+              </a:ext>
+              <a:ext uri="{C183D7F6-B498-43B3-948B-1728B52AA6E4}">
+                <adec:decorative xmlns:adec="http://schemas.microsoft.com/office/drawing/2017/decorative" val="1"/>
+              </a:ext>
+            </a:extLst>
+          </p:cNvPr>
+          <p:cNvSpPr>
+            <a:spLocks noGrp="1" noRot="1" noChangeAspect="1" noMove="1" noResize="1" noEditPoints="1" noAdjustHandles="1" noChangeArrowheads="1" noChangeShapeType="1" noTextEdit="1"/>
+          </p:cNvSpPr>
+          <p:nvPr>
+            <p:extLst>
+              <p:ext uri="{386F3935-93C4-4BCD-93E2-E3B085C9AB24}">
+                <p16:designElem xmlns:p16="http://schemas.microsoft.com/office/powerpoint/2015/main" val="1"/>
+              </p:ext>
+            </p:extLst>
+          </p:nvPr>
+        </p:nvSpPr>
+        <p:spPr>
+          <a:xfrm>
+            <a:off x="0" y="-2811"/>
+            <a:ext cx="899160" cy="6858000"/>
+          </a:xfrm>
+          <a:prstGeom prst="rect">
+            <a:avLst/>
+          </a:prstGeom>
+          <a:solidFill>
+            <a:schemeClr val="tx2">
+              <a:lumMod val="75000"/>
+            </a:schemeClr>
+          </a:solidFill>
+          <a:ln>
+            <a:noFill/>
+          </a:ln>
+        </p:spPr>
+        <p:style>
+          <a:lnRef idx="2">
+            <a:schemeClr val="accent1">
+              <a:shade val="50000"/>
+            </a:schemeClr>
+          </a:lnRef>
+          <a:fillRef idx="1">
+            <a:schemeClr val="accent1"/>
+          </a:fillRef>
+          <a:effectRef idx="0">
+            <a:schemeClr val="accent1"/>
+          </a:effectRef>
+          <a:fontRef idx="minor">
+            <a:schemeClr val="lt1"/>
+          </a:fontRef>
+        </p:style>
+        <p:txBody>
+          <a:bodyPr rtlCol="0" anchor="ctr"/>
+          <a:lstStyle/>
+          <a:p>
+            <a:pPr algn="ctr"/>
+            <a:endParaRPr lang="en-US"/>
+          </a:p>
+        </p:txBody>
+      </p:sp>
+      <p:sp>
+        <p:nvSpPr>
+          <p:cNvPr id="3" name="Content Placeholder 2">
+            <a:extLst>
+              <a:ext uri="{FF2B5EF4-FFF2-40B4-BE49-F238E27FC236}">
+                <a16:creationId xmlns:a16="http://schemas.microsoft.com/office/drawing/2014/main" id="{10A3F4B8-C6DC-42F4-A598-45F97634224F}"/>
+              </a:ext>
+            </a:extLst>
+          </p:cNvPr>
+          <p:cNvSpPr>
+            <a:spLocks noGrp="1"/>
+          </p:cNvSpPr>
+          <p:nvPr>
+            <p:ph idx="1"/>
+          </p:nvPr>
+        </p:nvSpPr>
+        <p:spPr>
+          <a:xfrm>
+            <a:off x="1220892" y="1828800"/>
+            <a:ext cx="9733620" cy="4351337"/>
+          </a:xfrm>
+        </p:spPr>
+        <p:txBody>
+          <a:bodyPr>
+            <a:normAutofit/>
+          </a:bodyPr>
+          <a:lstStyle/>
+          <a:p>
+            <a:endParaRPr lang="en-US" sz="2400">
+              <a:solidFill>
+                <a:srgbClr val="FFFFFF"/>
+              </a:solidFill>
+            </a:endParaRPr>
           </a:p>
         </p:txBody>
       </p:sp>
     </p:spTree>
     <p:extLst>
       <p:ext uri="{BB962C8B-B14F-4D97-AF65-F5344CB8AC3E}">
-        <p14:creationId xmlns:p14="http://schemas.microsoft.com/office/powerpoint/2010/main" val="4147911391"/>
+        <p14:creationId xmlns:p14="http://schemas.microsoft.com/office/powerpoint/2010/main" val="1648209520"/>
       </p:ext>
     </p:extLst>
   </p:cSld>
@@ -3898,6 +5657,14 @@
 <file path=ppt/slides/slide8.xml><?xml version="1.0" encoding="utf-8"?>
 <p:sld xmlns:a="http://schemas.openxmlformats.org/drawingml/2006/main" xmlns:r="http://schemas.openxmlformats.org/officeDocument/2006/relationships" xmlns:p="http://schemas.openxmlformats.org/presentationml/2006/main">
   <p:cSld>
+    <p:bg>
+      <p:bgPr>
+        <a:solidFill>
+          <a:schemeClr val="bg1"/>
+        </a:solidFill>
+        <a:effectLst/>
+      </p:bgPr>
+    </p:bg>
     <p:spTree>
       <p:nvGrpSpPr>
         <p:cNvPr id="1" name=""/>
@@ -3914,10 +5681,138 @@
       </p:grpSpPr>
       <p:sp>
         <p:nvSpPr>
+          <p:cNvPr id="8" name="Rectangle 7">
+            <a:extLst>
+              <a:ext uri="{FF2B5EF4-FFF2-40B4-BE49-F238E27FC236}">
+                <a16:creationId xmlns:a16="http://schemas.microsoft.com/office/drawing/2014/main" id="{F112E318-8843-4FBA-9CB8-AC44622DE78F}"/>
+              </a:ext>
+              <a:ext uri="{C183D7F6-B498-43B3-948B-1728B52AA6E4}">
+                <adec:decorative xmlns:adec="http://schemas.microsoft.com/office/drawing/2017/decorative" val="1"/>
+              </a:ext>
+            </a:extLst>
+          </p:cNvPr>
+          <p:cNvSpPr>
+            <a:spLocks noGrp="1" noRot="1" noChangeAspect="1" noMove="1" noResize="1" noEditPoints="1" noAdjustHandles="1" noChangeArrowheads="1" noChangeShapeType="1" noTextEdit="1"/>
+          </p:cNvSpPr>
+          <p:nvPr>
+            <p:extLst>
+              <p:ext uri="{386F3935-93C4-4BCD-93E2-E3B085C9AB24}">
+                <p16:designElem xmlns:p16="http://schemas.microsoft.com/office/powerpoint/2015/main" val="1"/>
+              </p:ext>
+            </p:extLst>
+          </p:nvPr>
+        </p:nvSpPr>
+        <p:spPr>
+          <a:xfrm>
+            <a:off x="0" y="0"/>
+            <a:ext cx="11292840" cy="6858000"/>
+          </a:xfrm>
+          <a:prstGeom prst="rect">
+            <a:avLst/>
+          </a:prstGeom>
+          <a:solidFill>
+            <a:srgbClr val="FFFFFF"/>
+          </a:solidFill>
+          <a:ln>
+            <a:noFill/>
+          </a:ln>
+        </p:spPr>
+        <p:style>
+          <a:lnRef idx="2">
+            <a:schemeClr val="accent1">
+              <a:shade val="50000"/>
+            </a:schemeClr>
+          </a:lnRef>
+          <a:fillRef idx="1">
+            <a:schemeClr val="accent1"/>
+          </a:fillRef>
+          <a:effectRef idx="0">
+            <a:schemeClr val="accent1"/>
+          </a:effectRef>
+          <a:fontRef idx="minor">
+            <a:schemeClr val="lt1"/>
+          </a:fontRef>
+        </p:style>
+        <p:txBody>
+          <a:bodyPr rtlCol="0" anchor="ctr"/>
+          <a:lstStyle/>
+          <a:p>
+            <a:pPr algn="ctr"/>
+            <a:endParaRPr lang="en-US"/>
+          </a:p>
+        </p:txBody>
+      </p:sp>
+      <p:sp>
+        <p:nvSpPr>
+          <p:cNvPr id="10" name="Rectangle 9">
+            <a:extLst>
+              <a:ext uri="{FF2B5EF4-FFF2-40B4-BE49-F238E27FC236}">
+                <a16:creationId xmlns:a16="http://schemas.microsoft.com/office/drawing/2014/main" id="{095418D5-11A6-457F-8BCD-5160B33D6935}"/>
+              </a:ext>
+              <a:ext uri="{C183D7F6-B498-43B3-948B-1728B52AA6E4}">
+                <adec:decorative xmlns:adec="http://schemas.microsoft.com/office/drawing/2017/decorative" val="1"/>
+              </a:ext>
+            </a:extLst>
+          </p:cNvPr>
+          <p:cNvSpPr>
+            <a:spLocks noGrp="1" noRot="1" noChangeAspect="1" noMove="1" noResize="1" noEditPoints="1" noAdjustHandles="1" noChangeArrowheads="1" noChangeShapeType="1" noTextEdit="1"/>
+          </p:cNvSpPr>
+          <p:nvPr>
+            <p:extLst>
+              <p:ext uri="{386F3935-93C4-4BCD-93E2-E3B085C9AB24}">
+                <p16:designElem xmlns:p16="http://schemas.microsoft.com/office/powerpoint/2015/main" val="1"/>
+              </p:ext>
+            </p:extLst>
+          </p:nvPr>
+        </p:nvSpPr>
+        <p:spPr>
+          <a:xfrm>
+            <a:off x="899160" y="0"/>
+            <a:ext cx="10393679" cy="6858000"/>
+          </a:xfrm>
+          <a:prstGeom prst="rect">
+            <a:avLst/>
+          </a:prstGeom>
+          <a:solidFill>
+            <a:schemeClr val="tx2">
+              <a:lumMod val="50000"/>
+            </a:schemeClr>
+          </a:solidFill>
+          <a:ln>
+            <a:noFill/>
+          </a:ln>
+        </p:spPr>
+        <p:style>
+          <a:lnRef idx="2">
+            <a:schemeClr val="accent1">
+              <a:shade val="50000"/>
+            </a:schemeClr>
+          </a:lnRef>
+          <a:fillRef idx="1">
+            <a:schemeClr val="accent1"/>
+          </a:fillRef>
+          <a:effectRef idx="0">
+            <a:schemeClr val="accent1"/>
+          </a:effectRef>
+          <a:fontRef idx="minor">
+            <a:schemeClr val="lt1"/>
+          </a:fontRef>
+        </p:style>
+        <p:txBody>
+          <a:bodyPr rtlCol="0" anchor="ctr"/>
+          <a:lstStyle/>
+          <a:p>
+            <a:pPr algn="ctr"/>
+            <a:endParaRPr lang="en-US"/>
+          </a:p>
+        </p:txBody>
+      </p:sp>
+      <p:sp>
+        <p:nvSpPr>
           <p:cNvPr id="2" name="Title 1">
             <a:extLst>
               <a:ext uri="{FF2B5EF4-FFF2-40B4-BE49-F238E27FC236}">
-                <a16:creationId xmlns:a16="http://schemas.microsoft.com/office/drawing/2014/main" id="{C9C3A5C8-8CF7-4F09-9B36-44F3D86EBEFD}"/>
+                <a16:creationId xmlns:a16="http://schemas.microsoft.com/office/drawing/2014/main" id="{CCB641FC-B164-4E97-B6D7-989EBB976D46}"/>
               </a:ext>
             </a:extLst>
           </p:cNvPr>
@@ -3928,22 +5823,135 @@
             <p:ph type="title"/>
           </p:nvPr>
         </p:nvSpPr>
-        <p:spPr/>
-        <p:txBody>
-          <a:bodyPr/>
-          <a:lstStyle/>
-          <a:p>
-            <a:r>
-              <a:rPr lang="en-US" dirty="0"/>
+        <p:spPr>
+          <a:xfrm>
+            <a:off x="1220892" y="321732"/>
+            <a:ext cx="9733620" cy="878397"/>
+          </a:xfrm>
+          <a:noFill/>
+        </p:spPr>
+        <p:txBody>
+          <a:bodyPr anchor="ctr">
+            <a:normAutofit/>
+          </a:bodyPr>
+          <a:lstStyle/>
+          <a:p>
+            <a:r>
+              <a:rPr lang="en-US" sz="4000" dirty="0">
+                <a:solidFill>
+                  <a:srgbClr val="FFFFFF"/>
+                </a:solidFill>
+              </a:rPr>
               <a:t>Code Sample</a:t>
             </a:r>
+          </a:p>
+        </p:txBody>
+      </p:sp>
+      <p:sp>
+        <p:nvSpPr>
+          <p:cNvPr id="12" name="Rectangle 11">
+            <a:extLst>
+              <a:ext uri="{FF2B5EF4-FFF2-40B4-BE49-F238E27FC236}">
+                <a16:creationId xmlns:a16="http://schemas.microsoft.com/office/drawing/2014/main" id="{D61E5C3D-6980-43E1-B38A-365BF0E6E3F3}"/>
+              </a:ext>
+              <a:ext uri="{C183D7F6-B498-43B3-948B-1728B52AA6E4}">
+                <adec:decorative xmlns:adec="http://schemas.microsoft.com/office/drawing/2017/decorative" val="1"/>
+              </a:ext>
+            </a:extLst>
+          </p:cNvPr>
+          <p:cNvSpPr>
+            <a:spLocks noGrp="1" noRot="1" noChangeAspect="1" noMove="1" noResize="1" noEditPoints="1" noAdjustHandles="1" noChangeArrowheads="1" noChangeShapeType="1" noTextEdit="1"/>
+          </p:cNvSpPr>
+          <p:nvPr>
+            <p:extLst>
+              <p:ext uri="{386F3935-93C4-4BCD-93E2-E3B085C9AB24}">
+                <p16:designElem xmlns:p16="http://schemas.microsoft.com/office/powerpoint/2015/main" val="1"/>
+              </p:ext>
+            </p:extLst>
+          </p:nvPr>
+        </p:nvSpPr>
+        <p:spPr>
+          <a:xfrm>
+            <a:off x="0" y="-2811"/>
+            <a:ext cx="899160" cy="6858000"/>
+          </a:xfrm>
+          <a:prstGeom prst="rect">
+            <a:avLst/>
+          </a:prstGeom>
+          <a:solidFill>
+            <a:schemeClr val="tx2">
+              <a:lumMod val="75000"/>
+            </a:schemeClr>
+          </a:solidFill>
+          <a:ln>
+            <a:noFill/>
+          </a:ln>
+        </p:spPr>
+        <p:style>
+          <a:lnRef idx="2">
+            <a:schemeClr val="accent1">
+              <a:shade val="50000"/>
+            </a:schemeClr>
+          </a:lnRef>
+          <a:fillRef idx="1">
+            <a:schemeClr val="accent1"/>
+          </a:fillRef>
+          <a:effectRef idx="0">
+            <a:schemeClr val="accent1"/>
+          </a:effectRef>
+          <a:fontRef idx="minor">
+            <a:schemeClr val="lt1"/>
+          </a:fontRef>
+        </p:style>
+        <p:txBody>
+          <a:bodyPr rtlCol="0" anchor="ctr"/>
+          <a:lstStyle/>
+          <a:p>
+            <a:pPr algn="ctr"/>
+            <a:endParaRPr lang="en-US"/>
+          </a:p>
+        </p:txBody>
+      </p:sp>
+      <p:sp>
+        <p:nvSpPr>
+          <p:cNvPr id="3" name="Content Placeholder 2">
+            <a:extLst>
+              <a:ext uri="{FF2B5EF4-FFF2-40B4-BE49-F238E27FC236}">
+                <a16:creationId xmlns:a16="http://schemas.microsoft.com/office/drawing/2014/main" id="{10A3F4B8-C6DC-42F4-A598-45F97634224F}"/>
+              </a:ext>
+            </a:extLst>
+          </p:cNvPr>
+          <p:cNvSpPr>
+            <a:spLocks noGrp="1"/>
+          </p:cNvSpPr>
+          <p:nvPr>
+            <p:ph idx="1"/>
+          </p:nvPr>
+        </p:nvSpPr>
+        <p:spPr>
+          <a:xfrm>
+            <a:off x="1220892" y="1828800"/>
+            <a:ext cx="9733620" cy="4351337"/>
+          </a:xfrm>
+        </p:spPr>
+        <p:txBody>
+          <a:bodyPr>
+            <a:normAutofit/>
+          </a:bodyPr>
+          <a:lstStyle/>
+          <a:p>
+            <a:endParaRPr lang="en-US" sz="2400">
+              <a:solidFill>
+                <a:srgbClr val="FFFFFF"/>
+              </a:solidFill>
+            </a:endParaRPr>
           </a:p>
         </p:txBody>
       </p:sp>
     </p:spTree>
     <p:extLst>
       <p:ext uri="{BB962C8B-B14F-4D97-AF65-F5344CB8AC3E}">
-        <p14:creationId xmlns:p14="http://schemas.microsoft.com/office/powerpoint/2010/main" val="3276410266"/>
+        <p14:creationId xmlns:p14="http://schemas.microsoft.com/office/powerpoint/2010/main" val="743705954"/>
       </p:ext>
     </p:extLst>
   </p:cSld>
@@ -3956,6 +5964,14 @@
 <file path=ppt/slides/slide9.xml><?xml version="1.0" encoding="utf-8"?>
 <p:sld xmlns:a="http://schemas.openxmlformats.org/drawingml/2006/main" xmlns:r="http://schemas.openxmlformats.org/officeDocument/2006/relationships" xmlns:p="http://schemas.openxmlformats.org/presentationml/2006/main">
   <p:cSld>
+    <p:bg>
+      <p:bgPr>
+        <a:solidFill>
+          <a:schemeClr val="bg1"/>
+        </a:solidFill>
+        <a:effectLst/>
+      </p:bgPr>
+    </p:bg>
     <p:spTree>
       <p:nvGrpSpPr>
         <p:cNvPr id="1" name=""/>
@@ -3972,6 +5988,168 @@
       </p:grpSpPr>
       <p:sp>
         <p:nvSpPr>
+          <p:cNvPr id="9" name="Rectangle 8">
+            <a:extLst>
+              <a:ext uri="{FF2B5EF4-FFF2-40B4-BE49-F238E27FC236}">
+                <a16:creationId xmlns:a16="http://schemas.microsoft.com/office/drawing/2014/main" id="{5D5E0904-721C-4D68-9EB8-1C9752E329A7}"/>
+              </a:ext>
+              <a:ext uri="{C183D7F6-B498-43B3-948B-1728B52AA6E4}">
+                <adec:decorative xmlns:adec="http://schemas.microsoft.com/office/drawing/2017/decorative" val="1"/>
+              </a:ext>
+            </a:extLst>
+          </p:cNvPr>
+          <p:cNvSpPr>
+            <a:spLocks noGrp="1" noRot="1" noChangeAspect="1" noMove="1" noResize="1" noEditPoints="1" noAdjustHandles="1" noChangeArrowheads="1" noChangeShapeType="1" noTextEdit="1"/>
+          </p:cNvSpPr>
+          <p:nvPr>
+            <p:extLst>
+              <p:ext uri="{386F3935-93C4-4BCD-93E2-E3B085C9AB24}">
+                <p16:designElem xmlns:p16="http://schemas.microsoft.com/office/powerpoint/2015/main" val="1"/>
+              </p:ext>
+            </p:extLst>
+          </p:nvPr>
+        </p:nvSpPr>
+        <p:spPr>
+          <a:xfrm>
+            <a:off x="0" y="0"/>
+            <a:ext cx="457200" cy="6858000"/>
+          </a:xfrm>
+          <a:prstGeom prst="rect">
+            <a:avLst/>
+          </a:prstGeom>
+          <a:solidFill>
+            <a:schemeClr val="accent1"/>
+          </a:solidFill>
+          <a:ln>
+            <a:noFill/>
+          </a:ln>
+        </p:spPr>
+        <p:style>
+          <a:lnRef idx="2">
+            <a:schemeClr val="accent1">
+              <a:shade val="50000"/>
+            </a:schemeClr>
+          </a:lnRef>
+          <a:fillRef idx="1">
+            <a:schemeClr val="accent1"/>
+          </a:fillRef>
+          <a:effectRef idx="0">
+            <a:schemeClr val="accent1"/>
+          </a:effectRef>
+          <a:fontRef idx="minor">
+            <a:schemeClr val="lt1"/>
+          </a:fontRef>
+        </p:style>
+      </p:sp>
+      <p:sp useBgFill="1">
+        <p:nvSpPr>
+          <p:cNvPr id="11" name="Rectangle 10">
+            <a:extLst>
+              <a:ext uri="{FF2B5EF4-FFF2-40B4-BE49-F238E27FC236}">
+                <a16:creationId xmlns:a16="http://schemas.microsoft.com/office/drawing/2014/main" id="{D0CDF5D3-7220-42A0-9D37-ECF3BF283B37}"/>
+              </a:ext>
+              <a:ext uri="{C183D7F6-B498-43B3-948B-1728B52AA6E4}">
+                <adec:decorative xmlns:adec="http://schemas.microsoft.com/office/drawing/2017/decorative" val="1"/>
+              </a:ext>
+            </a:extLst>
+          </p:cNvPr>
+          <p:cNvSpPr>
+            <a:spLocks noGrp="1" noRot="1" noChangeAspect="1" noMove="1" noResize="1" noEditPoints="1" noAdjustHandles="1" noChangeArrowheads="1" noChangeShapeType="1" noTextEdit="1"/>
+          </p:cNvSpPr>
+          <p:nvPr>
+            <p:extLst>
+              <p:ext uri="{386F3935-93C4-4BCD-93E2-E3B085C9AB24}">
+                <p16:designElem xmlns:p16="http://schemas.microsoft.com/office/powerpoint/2015/main" val="1"/>
+              </p:ext>
+            </p:extLst>
+          </p:nvPr>
+        </p:nvSpPr>
+        <p:spPr>
+          <a:xfrm>
+            <a:off x="457200" y="0"/>
+            <a:ext cx="10835640" cy="5105400"/>
+          </a:xfrm>
+          <a:prstGeom prst="rect">
+            <a:avLst/>
+          </a:prstGeom>
+          <a:ln>
+            <a:noFill/>
+          </a:ln>
+        </p:spPr>
+        <p:style>
+          <a:lnRef idx="2">
+            <a:schemeClr val="accent1">
+              <a:shade val="50000"/>
+            </a:schemeClr>
+          </a:lnRef>
+          <a:fillRef idx="1">
+            <a:schemeClr val="accent1"/>
+          </a:fillRef>
+          <a:effectRef idx="0">
+            <a:schemeClr val="accent1"/>
+          </a:effectRef>
+          <a:fontRef idx="minor">
+            <a:schemeClr val="lt1"/>
+          </a:fontRef>
+        </p:style>
+      </p:sp>
+      <p:sp>
+        <p:nvSpPr>
+          <p:cNvPr id="13" name="Rectangle 12">
+            <a:extLst>
+              <a:ext uri="{FF2B5EF4-FFF2-40B4-BE49-F238E27FC236}">
+                <a16:creationId xmlns:a16="http://schemas.microsoft.com/office/drawing/2014/main" id="{64BC717F-58B3-4A4E-BC3B-1B11323AD5C9}"/>
+              </a:ext>
+              <a:ext uri="{C183D7F6-B498-43B3-948B-1728B52AA6E4}">
+                <adec:decorative xmlns:adec="http://schemas.microsoft.com/office/drawing/2017/decorative" val="1"/>
+              </a:ext>
+            </a:extLst>
+          </p:cNvPr>
+          <p:cNvSpPr>
+            <a:spLocks noGrp="1" noRot="1" noChangeAspect="1" noMove="1" noResize="1" noEditPoints="1" noAdjustHandles="1" noChangeArrowheads="1" noChangeShapeType="1" noTextEdit="1"/>
+          </p:cNvSpPr>
+          <p:nvPr>
+            <p:extLst>
+              <p:ext uri="{386F3935-93C4-4BCD-93E2-E3B085C9AB24}">
+                <p16:designElem xmlns:p16="http://schemas.microsoft.com/office/powerpoint/2015/main" val="1"/>
+              </p:ext>
+            </p:extLst>
+          </p:nvPr>
+        </p:nvSpPr>
+        <p:spPr>
+          <a:xfrm>
+            <a:off x="457200" y="5105400"/>
+            <a:ext cx="10835640" cy="1752600"/>
+          </a:xfrm>
+          <a:prstGeom prst="rect">
+            <a:avLst/>
+          </a:prstGeom>
+          <a:solidFill>
+            <a:srgbClr val="353537"/>
+          </a:solidFill>
+          <a:ln>
+            <a:noFill/>
+          </a:ln>
+        </p:spPr>
+        <p:style>
+          <a:lnRef idx="2">
+            <a:schemeClr val="accent1">
+              <a:shade val="50000"/>
+            </a:schemeClr>
+          </a:lnRef>
+          <a:fillRef idx="1">
+            <a:schemeClr val="accent1"/>
+          </a:fillRef>
+          <a:effectRef idx="0">
+            <a:schemeClr val="accent1"/>
+          </a:effectRef>
+          <a:fontRef idx="minor">
+            <a:schemeClr val="lt1"/>
+          </a:fontRef>
+        </p:style>
+      </p:sp>
+      <p:sp>
+        <p:nvSpPr>
           <p:cNvPr id="2" name="Title 1">
             <a:extLst>
               <a:ext uri="{FF2B5EF4-FFF2-40B4-BE49-F238E27FC236}">
@@ -3986,15 +6164,196 @@
             <p:ph type="title"/>
           </p:nvPr>
         </p:nvSpPr>
-        <p:spPr/>
-        <p:txBody>
-          <a:bodyPr/>
-          <a:lstStyle/>
-          <a:p>
-            <a:r>
-              <a:rPr lang="en-US"/>
+        <p:spPr>
+          <a:xfrm>
+            <a:off x="944183" y="5181600"/>
+            <a:ext cx="10156435" cy="1076324"/>
+          </a:xfrm>
+        </p:spPr>
+        <p:txBody>
+          <a:bodyPr vert="horz" lIns="91440" tIns="45720" rIns="91440" bIns="45720" rtlCol="0" anchor="b">
+            <a:normAutofit/>
+          </a:bodyPr>
+          <a:lstStyle/>
+          <a:p>
+            <a:pPr>
+              <a:lnSpc>
+                <a:spcPct val="85000"/>
+              </a:lnSpc>
+            </a:pPr>
+            <a:r>
+              <a:rPr lang="en-US" sz="5400">
+                <a:solidFill>
+                  <a:srgbClr val="FFFFFF"/>
+                </a:solidFill>
+              </a:rPr>
               <a:t>Questions</a:t>
             </a:r>
+          </a:p>
+        </p:txBody>
+      </p:sp>
+      <p:sp>
+        <p:nvSpPr>
+          <p:cNvPr id="15" name="Rectangle 14">
+            <a:extLst>
+              <a:ext uri="{FF2B5EF4-FFF2-40B4-BE49-F238E27FC236}">
+                <a16:creationId xmlns:a16="http://schemas.microsoft.com/office/drawing/2014/main" id="{1EE75710-64C5-4CA8-8A7C-82EE4125C90D}"/>
+              </a:ext>
+              <a:ext uri="{C183D7F6-B498-43B3-948B-1728B52AA6E4}">
+                <adec:decorative xmlns:adec="http://schemas.microsoft.com/office/drawing/2017/decorative" val="1"/>
+              </a:ext>
+            </a:extLst>
+          </p:cNvPr>
+          <p:cNvSpPr>
+            <a:spLocks noGrp="1" noRot="1" noChangeAspect="1" noMove="1" noResize="1" noEditPoints="1" noAdjustHandles="1" noChangeArrowheads="1" noChangeShapeType="1" noTextEdit="1"/>
+          </p:cNvSpPr>
+          <p:nvPr>
+            <p:extLst>
+              <p:ext uri="{386F3935-93C4-4BCD-93E2-E3B085C9AB24}">
+                <p16:designElem xmlns:p16="http://schemas.microsoft.com/office/powerpoint/2015/main" val="1"/>
+              </p:ext>
+            </p:extLst>
+          </p:nvPr>
+        </p:nvSpPr>
+        <p:spPr>
+          <a:xfrm>
+            <a:off x="0" y="-3244"/>
+            <a:ext cx="457200" cy="6858000"/>
+          </a:xfrm>
+          <a:prstGeom prst="rect">
+            <a:avLst/>
+          </a:prstGeom>
+          <a:solidFill>
+            <a:srgbClr val="6F6F74"/>
+          </a:solidFill>
+          <a:ln>
+            <a:noFill/>
+          </a:ln>
+        </p:spPr>
+        <p:style>
+          <a:lnRef idx="2">
+            <a:schemeClr val="accent1">
+              <a:shade val="50000"/>
+            </a:schemeClr>
+          </a:lnRef>
+          <a:fillRef idx="1">
+            <a:schemeClr val="accent1"/>
+          </a:fillRef>
+          <a:effectRef idx="0">
+            <a:schemeClr val="accent1"/>
+          </a:effectRef>
+          <a:fontRef idx="minor">
+            <a:schemeClr val="lt1"/>
+          </a:fontRef>
+        </p:style>
+        <p:txBody>
+          <a:bodyPr rtlCol="0" anchor="ctr"/>
+          <a:lstStyle/>
+          <a:p>
+            <a:pPr algn="ctr"/>
+            <a:endParaRPr lang="en-US"/>
+          </a:p>
+        </p:txBody>
+      </p:sp>
+      <p:pic>
+        <p:nvPicPr>
+          <p:cNvPr id="6" name="Graphic 5" descr="Help">
+            <a:extLst>
+              <a:ext uri="{FF2B5EF4-FFF2-40B4-BE49-F238E27FC236}">
+                <a16:creationId xmlns:a16="http://schemas.microsoft.com/office/drawing/2014/main" id="{9A794465-24D3-41DD-9936-7CC2901A3B1A}"/>
+              </a:ext>
+            </a:extLst>
+          </p:cNvPr>
+          <p:cNvPicPr>
+            <a:picLocks noChangeAspect="1"/>
+          </p:cNvPicPr>
+          <p:nvPr/>
+        </p:nvPicPr>
+        <p:blipFill>
+          <a:blip r:embed="rId2">
+            <a:extLst>
+              <a:ext uri="{28A0092B-C50C-407E-A947-70E740481C1C}">
+                <a14:useLocalDpi xmlns:a14="http://schemas.microsoft.com/office/drawing/2010/main" val="0"/>
+              </a:ext>
+              <a:ext uri="{96DAC541-7B7A-43D3-8B79-37D633B846F1}">
+                <asvg:svgBlip xmlns:asvg="http://schemas.microsoft.com/office/drawing/2016/SVG/main" r:embed="rId3"/>
+              </a:ext>
+            </a:extLst>
+          </a:blip>
+          <a:stretch>
+            <a:fillRect/>
+          </a:stretch>
+        </p:blipFill>
+        <p:spPr>
+          <a:xfrm>
+            <a:off x="1097280" y="640081"/>
+            <a:ext cx="3825240" cy="3825240"/>
+          </a:xfrm>
+          <a:prstGeom prst="rect">
+            <a:avLst/>
+          </a:prstGeom>
+        </p:spPr>
+      </p:pic>
+      <p:sp>
+        <p:nvSpPr>
+          <p:cNvPr id="17" name="Rectangle 16">
+            <a:extLst>
+              <a:ext uri="{FF2B5EF4-FFF2-40B4-BE49-F238E27FC236}">
+                <a16:creationId xmlns:a16="http://schemas.microsoft.com/office/drawing/2014/main" id="{435050B1-74E1-4A81-923D-0F5971A3BC01}"/>
+              </a:ext>
+              <a:ext uri="{C183D7F6-B498-43B3-948B-1728B52AA6E4}">
+                <adec:decorative xmlns:adec="http://schemas.microsoft.com/office/drawing/2017/decorative" val="1"/>
+              </a:ext>
+            </a:extLst>
+          </p:cNvPr>
+          <p:cNvSpPr>
+            <a:spLocks noGrp="1" noRot="1" noChangeAspect="1" noMove="1" noResize="1" noEditPoints="1" noAdjustHandles="1" noChangeArrowheads="1" noChangeShapeType="1" noTextEdit="1"/>
+          </p:cNvSpPr>
+          <p:nvPr>
+            <p:extLst>
+              <p:ext uri="{386F3935-93C4-4BCD-93E2-E3B085C9AB24}">
+                <p16:designElem xmlns:p16="http://schemas.microsoft.com/office/powerpoint/2015/main" val="1"/>
+              </p:ext>
+            </p:extLst>
+          </p:nvPr>
+        </p:nvSpPr>
+        <p:spPr>
+          <a:xfrm>
+            <a:off x="11292840" y="0"/>
+            <a:ext cx="899160" cy="6858000"/>
+          </a:xfrm>
+          <a:prstGeom prst="rect">
+            <a:avLst/>
+          </a:prstGeom>
+          <a:solidFill>
+            <a:srgbClr val="353537"/>
+          </a:solidFill>
+          <a:ln>
+            <a:noFill/>
+          </a:ln>
+        </p:spPr>
+        <p:style>
+          <a:lnRef idx="2">
+            <a:schemeClr val="accent1">
+              <a:shade val="50000"/>
+            </a:schemeClr>
+          </a:lnRef>
+          <a:fillRef idx="1">
+            <a:schemeClr val="accent1"/>
+          </a:fillRef>
+          <a:effectRef idx="0">
+            <a:schemeClr val="accent1"/>
+          </a:effectRef>
+          <a:fontRef idx="minor">
+            <a:schemeClr val="lt1"/>
+          </a:fontRef>
+        </p:style>
+        <p:txBody>
+          <a:bodyPr rtlCol="0" anchor="ctr"/>
+          <a:lstStyle/>
+          <a:p>
+            <a:pPr algn="ctr"/>
+            <a:endParaRPr lang="en-US"/>
           </a:p>
         </p:txBody>
       </p:sp>

</xml_diff>